<commit_message>
Intermediate stage in fixing issues with the solid obstacles.
There are still issues with the solid obstacles. Using them as they are currently
implemented creates a large instability visible in the Test/Solids test case.
</commit_message>
<xml_diff>
--- a/Documentation/ParisSimulator.pptx
+++ b/Documentation/ParisSimulator.pptx
@@ -15,11 +15,9 @@
     <p:sldId id="265" r:id="rId9"/>
     <p:sldId id="266" r:id="rId10"/>
     <p:sldId id="264" r:id="rId11"/>
-    <p:sldId id="260" r:id="rId12"/>
-    <p:sldId id="267" r:id="rId13"/>
-    <p:sldId id="268" r:id="rId14"/>
-    <p:sldId id="269" r:id="rId15"/>
-    <p:sldId id="270" r:id="rId16"/>
+    <p:sldId id="267" r:id="rId12"/>
+    <p:sldId id="268" r:id="rId13"/>
+    <p:sldId id="269" r:id="rId14"/>
   </p:sldIdLst>
   <p:sldSz cx="9144000" cy="6858000" type="screen4x3"/>
   <p:notesSz cx="6858000" cy="9144000"/>
@@ -302,7 +300,7 @@
           <a:p>
             <a:fld id="{3E385DA3-9999-6A48-ABB1-3CFD9335C687}" type="datetimeFigureOut">
               <a:rPr lang="fr-FR" smtClean="0"/>
-              <a:t>11/10/12</a:t>
+              <a:t>09/04/13</a:t>
             </a:fld>
             <a:endParaRPr lang="fr-FR"/>
           </a:p>
@@ -472,7 +470,7 @@
           <a:p>
             <a:fld id="{3E385DA3-9999-6A48-ABB1-3CFD9335C687}" type="datetimeFigureOut">
               <a:rPr lang="fr-FR" smtClean="0"/>
-              <a:t>11/10/12</a:t>
+              <a:t>09/04/13</a:t>
             </a:fld>
             <a:endParaRPr lang="fr-FR"/>
           </a:p>
@@ -652,7 +650,7 @@
           <a:p>
             <a:fld id="{3E385DA3-9999-6A48-ABB1-3CFD9335C687}" type="datetimeFigureOut">
               <a:rPr lang="fr-FR" smtClean="0"/>
-              <a:t>11/10/12</a:t>
+              <a:t>09/04/13</a:t>
             </a:fld>
             <a:endParaRPr lang="fr-FR"/>
           </a:p>
@@ -822,7 +820,7 @@
           <a:p>
             <a:fld id="{3E385DA3-9999-6A48-ABB1-3CFD9335C687}" type="datetimeFigureOut">
               <a:rPr lang="fr-FR" smtClean="0"/>
-              <a:t>11/10/12</a:t>
+              <a:t>09/04/13</a:t>
             </a:fld>
             <a:endParaRPr lang="fr-FR"/>
           </a:p>
@@ -1068,7 +1066,7 @@
           <a:p>
             <a:fld id="{3E385DA3-9999-6A48-ABB1-3CFD9335C687}" type="datetimeFigureOut">
               <a:rPr lang="fr-FR" smtClean="0"/>
-              <a:t>11/10/12</a:t>
+              <a:t>09/04/13</a:t>
             </a:fld>
             <a:endParaRPr lang="fr-FR"/>
           </a:p>
@@ -1356,7 +1354,7 @@
           <a:p>
             <a:fld id="{3E385DA3-9999-6A48-ABB1-3CFD9335C687}" type="datetimeFigureOut">
               <a:rPr lang="fr-FR" smtClean="0"/>
-              <a:t>11/10/12</a:t>
+              <a:t>09/04/13</a:t>
             </a:fld>
             <a:endParaRPr lang="fr-FR"/>
           </a:p>
@@ -1778,7 +1776,7 @@
           <a:p>
             <a:fld id="{3E385DA3-9999-6A48-ABB1-3CFD9335C687}" type="datetimeFigureOut">
               <a:rPr lang="fr-FR" smtClean="0"/>
-              <a:t>11/10/12</a:t>
+              <a:t>09/04/13</a:t>
             </a:fld>
             <a:endParaRPr lang="fr-FR"/>
           </a:p>
@@ -1896,7 +1894,7 @@
           <a:p>
             <a:fld id="{3E385DA3-9999-6A48-ABB1-3CFD9335C687}" type="datetimeFigureOut">
               <a:rPr lang="fr-FR" smtClean="0"/>
-              <a:t>11/10/12</a:t>
+              <a:t>09/04/13</a:t>
             </a:fld>
             <a:endParaRPr lang="fr-FR"/>
           </a:p>
@@ -1991,7 +1989,7 @@
           <a:p>
             <a:fld id="{3E385DA3-9999-6A48-ABB1-3CFD9335C687}" type="datetimeFigureOut">
               <a:rPr lang="fr-FR" smtClean="0"/>
-              <a:t>11/10/12</a:t>
+              <a:t>09/04/13</a:t>
             </a:fld>
             <a:endParaRPr lang="fr-FR"/>
           </a:p>
@@ -2268,7 +2266,7 @@
           <a:p>
             <a:fld id="{3E385DA3-9999-6A48-ABB1-3CFD9335C687}" type="datetimeFigureOut">
               <a:rPr lang="fr-FR" smtClean="0"/>
-              <a:t>11/10/12</a:t>
+              <a:t>09/04/13</a:t>
             </a:fld>
             <a:endParaRPr lang="fr-FR"/>
           </a:p>
@@ -2521,7 +2519,7 @@
           <a:p>
             <a:fld id="{3E385DA3-9999-6A48-ABB1-3CFD9335C687}" type="datetimeFigureOut">
               <a:rPr lang="fr-FR" smtClean="0"/>
-              <a:t>11/10/12</a:t>
+              <a:t>09/04/13</a:t>
             </a:fld>
             <a:endParaRPr lang="fr-FR"/>
           </a:p>
@@ -2734,7 +2732,7 @@
           <a:p>
             <a:fld id="{3E385DA3-9999-6A48-ABB1-3CFD9335C687}" type="datetimeFigureOut">
               <a:rPr lang="fr-FR" smtClean="0"/>
-              <a:t>11/10/12</a:t>
+              <a:t>09/04/13</a:t>
             </a:fld>
             <a:endParaRPr lang="fr-FR"/>
           </a:p>
@@ -3165,6 +3163,13 @@
   <p:clrMapOvr>
     <a:masterClrMapping/>
   </p:clrMapOvr>
+  <p:timing>
+    <p:tnLst>
+      <p:par>
+        <p:cTn xmlns:p14="http://schemas.microsoft.com/office/powerpoint/2010/main" id="1" dur="indefinite" restart="never" nodeType="tmRoot"/>
+      </p:par>
+    </p:tnLst>
+  </p:timing>
 </p:sld>
 </file>
 
@@ -3206,36 +3211,36 @@
           </a:bodyPr>
           <a:lstStyle/>
           <a:p>
-            <a:endParaRPr lang="fr-FR" dirty="0"/>
-          </a:p>
-          <a:p>
-            <a:r>
-              <a:rPr lang="fr-FR" dirty="0"/>
+            <a:endParaRPr lang="fr-FR" dirty="0" smtClean="0"/>
+          </a:p>
+          <a:p>
+            <a:r>
+              <a:rPr lang="fr-FR" dirty="0" smtClean="0"/>
               <a:t>- </a:t>
             </a:r>
             <a:r>
-              <a:rPr lang="fr-FR" i="1" dirty="0"/>
+              <a:rPr lang="fr-FR" i="1" dirty="0" smtClean="0"/>
               <a:t>paris-stable </a:t>
             </a:r>
             <a:r>
-              <a:rPr lang="fr-FR" dirty="0"/>
+              <a:rPr lang="fr-FR" dirty="0" smtClean="0"/>
               <a:t>has </a:t>
             </a:r>
             <a:r>
-              <a:rPr lang="fr-FR" dirty="0" err="1"/>
+              <a:rPr lang="fr-FR" dirty="0" err="1" smtClean="0"/>
               <a:t>now</a:t>
             </a:r>
             <a:r>
-              <a:rPr lang="fr-FR" dirty="0"/>
-              <a:t> 1936 </a:t>
-            </a:r>
-            <a:r>
-              <a:rPr lang="fr-FR" dirty="0" err="1"/>
+              <a:rPr lang="fr-FR" dirty="0" smtClean="0"/>
+              <a:t>  5335 </a:t>
+            </a:r>
+            <a:r>
+              <a:rPr lang="fr-FR" dirty="0" err="1" smtClean="0"/>
               <a:t>lines</a:t>
             </a:r>
             <a:r>
-              <a:rPr lang="fr-FR" dirty="0"/>
-              <a:t> in four source files. </a:t>
+              <a:rPr lang="fr-FR" dirty="0" smtClean="0"/>
+              <a:t> in four source files (April 9, 2013). </a:t>
             </a:r>
           </a:p>
           <a:p>
@@ -3339,543 +3344,6 @@
 </file>
 
 <file path=ppt/slides/slide11.xml><?xml version="1.0" encoding="utf-8"?>
-<p:sld xmlns:a="http://schemas.openxmlformats.org/drawingml/2006/main" xmlns:r="http://schemas.openxmlformats.org/officeDocument/2006/relationships" xmlns:p="http://schemas.openxmlformats.org/presentationml/2006/main">
-  <p:cSld>
-    <p:spTree>
-      <p:nvGrpSpPr>
-        <p:cNvPr id="1" name=""/>
-        <p:cNvGrpSpPr/>
-        <p:nvPr/>
-      </p:nvGrpSpPr>
-      <p:grpSpPr>
-        <a:xfrm>
-          <a:off x="0" y="0"/>
-          <a:ext cx="0" cy="0"/>
-          <a:chOff x="0" y="0"/>
-          <a:chExt cx="0" cy="0"/>
-        </a:xfrm>
-      </p:grpSpPr>
-      <p:sp>
-        <p:nvSpPr>
-          <p:cNvPr id="2" name="Text Box 2"/>
-          <p:cNvSpPr txBox="1">
-            <a:spLocks noChangeArrowheads="1"/>
-          </p:cNvSpPr>
-          <p:nvPr/>
-        </p:nvSpPr>
-        <p:spPr bwMode="auto">
-          <a:xfrm>
-            <a:off x="901701" y="609122"/>
-            <a:ext cx="7586745" cy="923330"/>
-          </a:xfrm>
-          <a:prstGeom prst="rect">
-            <a:avLst/>
-          </a:prstGeom>
-          <a:noFill/>
-          <a:ln>
-            <a:noFill/>
-          </a:ln>
-          <a:effectLst/>
-          <a:extLst>
-            <a:ext uri="{909E8E84-426E-40dd-AFC4-6F175D3DCCD1}">
-              <a14:hiddenFill xmlns:a14="http://schemas.microsoft.com/office/drawing/2010/main">
-                <a:solidFill>
-                  <a:schemeClr val="accent1"/>
-                </a:solidFill>
-              </a14:hiddenFill>
-            </a:ext>
-            <a:ext uri="{91240B29-F687-4f45-9708-019B960494DF}">
-              <a14:hiddenLine xmlns:a14="http://schemas.microsoft.com/office/drawing/2010/main" w="28575">
-                <a:solidFill>
-                  <a:schemeClr val="accent2"/>
-                </a:solidFill>
-                <a:miter lim="800000"/>
-                <a:headEnd/>
-                <a:tailEnd/>
-              </a14:hiddenLine>
-            </a:ext>
-            <a:ext uri="{AF507438-7753-43e0-B8FC-AC1667EBCBE1}">
-              <a14:hiddenEffects xmlns:a14="http://schemas.microsoft.com/office/drawing/2010/main">
-                <a:effectLst>
-                  <a:outerShdw blurRad="63500" dist="38099" dir="2700000" algn="ctr" rotWithShape="0">
-                    <a:schemeClr val="bg2">
-                      <a:alpha val="74998"/>
-                    </a:schemeClr>
-                  </a:outerShdw>
-                </a:effectLst>
-              </a14:hiddenEffects>
-            </a:ext>
-          </a:extLst>
-        </p:spPr>
-        <p:txBody>
-          <a:bodyPr wrap="none">
-            <a:spAutoFit/>
-          </a:bodyPr>
-          <a:lstStyle/>
-          <a:p>
-            <a:r>
-              <a:rPr lang="fr-FR" dirty="0" smtClean="0"/>
-              <a:t>The ENO </a:t>
-            </a:r>
-            <a:r>
-              <a:rPr lang="fr-FR" dirty="0" err="1" smtClean="0"/>
-              <a:t>scheme</a:t>
-            </a:r>
-            <a:r>
-              <a:rPr lang="fr-FR" dirty="0" smtClean="0"/>
-              <a:t> of  </a:t>
-            </a:r>
-            <a:r>
-              <a:rPr lang="fr-FR" dirty="0" err="1"/>
-              <a:t>Shu</a:t>
-            </a:r>
-            <a:r>
-              <a:rPr lang="fr-FR" dirty="0"/>
-              <a:t> et </a:t>
-            </a:r>
-            <a:r>
-              <a:rPr lang="fr-FR" dirty="0" err="1" smtClean="0"/>
-              <a:t>Osher</a:t>
-            </a:r>
-            <a:r>
-              <a:rPr lang="fr-FR" dirty="0" smtClean="0"/>
-              <a:t> (</a:t>
-            </a:r>
-            <a:r>
-              <a:rPr lang="fr-FR" dirty="0" err="1" smtClean="0"/>
-              <a:t>similar</a:t>
-            </a:r>
-            <a:r>
-              <a:rPr lang="fr-FR" dirty="0" smtClean="0"/>
-              <a:t> to the BCG </a:t>
-            </a:r>
-            <a:r>
-              <a:rPr lang="fr-FR" dirty="0" err="1" smtClean="0"/>
-              <a:t>scheme</a:t>
-            </a:r>
-            <a:r>
-              <a:rPr lang="fr-FR" dirty="0" smtClean="0"/>
-              <a:t> </a:t>
-            </a:r>
-            <a:r>
-              <a:rPr lang="fr-FR" dirty="0" err="1" smtClean="0"/>
-              <a:t>used</a:t>
-            </a:r>
-            <a:r>
-              <a:rPr lang="fr-FR" dirty="0" smtClean="0"/>
-              <a:t> in Gerris) : </a:t>
-            </a:r>
-          </a:p>
-          <a:p>
-            <a:r>
-              <a:rPr lang="fr-FR" dirty="0" smtClean="0"/>
-              <a:t>the </a:t>
-            </a:r>
-            <a:r>
-              <a:rPr lang="fr-FR" dirty="0" err="1" smtClean="0"/>
-              <a:t>velocities</a:t>
-            </a:r>
-            <a:r>
-              <a:rPr lang="fr-FR" dirty="0" smtClean="0"/>
-              <a:t> </a:t>
-            </a:r>
-            <a:r>
-              <a:rPr lang="fr-FR" dirty="0" err="1" smtClean="0"/>
-              <a:t>interpolated</a:t>
-            </a:r>
-            <a:r>
-              <a:rPr lang="fr-FR" dirty="0" smtClean="0"/>
-              <a:t> </a:t>
-            </a:r>
-            <a:r>
-              <a:rPr lang="fr-FR" dirty="0" err="1" smtClean="0"/>
-              <a:t>at</a:t>
-            </a:r>
-            <a:r>
-              <a:rPr lang="fr-FR" dirty="0" smtClean="0"/>
-              <a:t> the faces of control volumes (</a:t>
-            </a:r>
-            <a:r>
-              <a:rPr lang="fr-FR" dirty="0" err="1" smtClean="0"/>
-              <a:t>centered</a:t>
-            </a:r>
-            <a:r>
-              <a:rPr lang="fr-FR" dirty="0" smtClean="0"/>
-              <a:t> on i+1/2,j) </a:t>
-            </a:r>
-          </a:p>
-          <a:p>
-            <a:r>
-              <a:rPr lang="fr-FR" dirty="0" smtClean="0"/>
-              <a:t>are :</a:t>
-            </a:r>
-            <a:endParaRPr lang="fr-FR" dirty="0"/>
-          </a:p>
-        </p:txBody>
-      </p:sp>
-      <p:pic>
-        <p:nvPicPr>
-          <p:cNvPr id="3" name="Picture 3" descr="55"/>
-          <p:cNvPicPr preferRelativeResize="0">
-            <a:picLocks noChangeAspect="1" noChangeArrowheads="1"/>
-          </p:cNvPicPr>
-          <p:nvPr/>
-        </p:nvPicPr>
-        <p:blipFill>
-          <a:blip r:embed="rId2">
-            <a:extLst>
-              <a:ext uri="{28A0092B-C50C-407E-A947-70E740481C1C}">
-                <a14:useLocalDpi xmlns:a14="http://schemas.microsoft.com/office/drawing/2010/main" val="0"/>
-              </a:ext>
-            </a:extLst>
-          </a:blip>
-          <a:srcRect/>
-          <a:stretch>
-            <a:fillRect/>
-          </a:stretch>
-        </p:blipFill>
-        <p:spPr bwMode="auto">
-          <a:xfrm>
-            <a:off x="1090613" y="1726530"/>
-            <a:ext cx="6680200" cy="1193800"/>
-          </a:xfrm>
-          <a:prstGeom prst="rect">
-            <a:avLst/>
-          </a:prstGeom>
-          <a:noFill/>
-          <a:extLst>
-            <a:ext uri="{909E8E84-426E-40dd-AFC4-6F175D3DCCD1}">
-              <a14:hiddenFill xmlns:a14="http://schemas.microsoft.com/office/drawing/2010/main">
-                <a:solidFill>
-                  <a:srgbClr val="FFFFFF"/>
-                </a:solidFill>
-              </a14:hiddenFill>
-            </a:ext>
-          </a:extLst>
-        </p:spPr>
-      </p:pic>
-      <p:sp>
-        <p:nvSpPr>
-          <p:cNvPr id="4" name="Text Box 4"/>
-          <p:cNvSpPr txBox="1">
-            <a:spLocks noChangeArrowheads="1"/>
-          </p:cNvSpPr>
-          <p:nvPr/>
-        </p:nvSpPr>
-        <p:spPr bwMode="auto">
-          <a:xfrm>
-            <a:off x="1038226" y="3318429"/>
-            <a:ext cx="7148111" cy="369332"/>
-          </a:xfrm>
-          <a:prstGeom prst="rect">
-            <a:avLst/>
-          </a:prstGeom>
-          <a:noFill/>
-          <a:ln>
-            <a:noFill/>
-          </a:ln>
-          <a:effectLst/>
-          <a:extLst>
-            <a:ext uri="{909E8E84-426E-40dd-AFC4-6F175D3DCCD1}">
-              <a14:hiddenFill xmlns:a14="http://schemas.microsoft.com/office/drawing/2010/main">
-                <a:solidFill>
-                  <a:schemeClr val="accent1"/>
-                </a:solidFill>
-              </a14:hiddenFill>
-            </a:ext>
-            <a:ext uri="{91240B29-F687-4f45-9708-019B960494DF}">
-              <a14:hiddenLine xmlns:a14="http://schemas.microsoft.com/office/drawing/2010/main" w="28575">
-                <a:solidFill>
-                  <a:schemeClr val="accent2"/>
-                </a:solidFill>
-                <a:miter lim="800000"/>
-                <a:headEnd/>
-                <a:tailEnd/>
-              </a14:hiddenLine>
-            </a:ext>
-            <a:ext uri="{AF507438-7753-43e0-B8FC-AC1667EBCBE1}">
-              <a14:hiddenEffects xmlns:a14="http://schemas.microsoft.com/office/drawing/2010/main">
-                <a:effectLst>
-                  <a:outerShdw blurRad="63500" dist="38099" dir="2700000" algn="ctr" rotWithShape="0">
-                    <a:schemeClr val="bg2">
-                      <a:alpha val="74998"/>
-                    </a:schemeClr>
-                  </a:outerShdw>
-                </a:effectLst>
-              </a14:hiddenEffects>
-            </a:ext>
-          </a:extLst>
-        </p:spPr>
-        <p:txBody>
-          <a:bodyPr wrap="none">
-            <a:spAutoFit/>
-          </a:bodyPr>
-          <a:lstStyle/>
-          <a:p>
-            <a:r>
-              <a:rPr lang="fr-FR" dirty="0" err="1" smtClean="0"/>
-              <a:t>where</a:t>
-            </a:r>
-            <a:r>
-              <a:rPr lang="fr-FR" dirty="0" smtClean="0"/>
-              <a:t> the </a:t>
-            </a:r>
-            <a:r>
-              <a:rPr lang="fr-FR" dirty="0" err="1" smtClean="0"/>
-              <a:t>slope</a:t>
-            </a:r>
-            <a:r>
-              <a:rPr lang="fr-FR" dirty="0" smtClean="0"/>
-              <a:t> </a:t>
-            </a:r>
-            <a:r>
-              <a:rPr lang="fr-FR" i="1" dirty="0" smtClean="0"/>
-              <a:t>s</a:t>
-            </a:r>
-            <a:r>
-              <a:rPr lang="fr-FR" i="1" baseline="-25000" dirty="0" smtClean="0"/>
-              <a:t>i</a:t>
-            </a:r>
-            <a:r>
-              <a:rPr lang="fr-FR" i="1" dirty="0" smtClean="0"/>
-              <a:t> </a:t>
-            </a:r>
-            <a:r>
-              <a:rPr lang="fr-FR" dirty="0" err="1" smtClean="0"/>
-              <a:t>is</a:t>
-            </a:r>
-            <a:r>
-              <a:rPr lang="fr-FR" dirty="0" smtClean="0"/>
-              <a:t> the </a:t>
-            </a:r>
-            <a:r>
-              <a:rPr lang="fr-FR" dirty="0" err="1" smtClean="0"/>
-              <a:t>smallest</a:t>
-            </a:r>
-            <a:r>
-              <a:rPr lang="fr-FR" dirty="0" smtClean="0"/>
-              <a:t>, in </a:t>
-            </a:r>
-            <a:r>
-              <a:rPr lang="fr-FR" dirty="0" err="1" smtClean="0"/>
-              <a:t>absolute</a:t>
-            </a:r>
-            <a:r>
-              <a:rPr lang="fr-FR" dirty="0" smtClean="0"/>
-              <a:t> value of the </a:t>
-            </a:r>
-            <a:r>
-              <a:rPr lang="fr-FR" dirty="0" err="1" smtClean="0"/>
-              <a:t>two</a:t>
-            </a:r>
-            <a:r>
-              <a:rPr lang="fr-FR" dirty="0" smtClean="0"/>
-              <a:t> expressions:</a:t>
-            </a:r>
-            <a:endParaRPr lang="fr-FR" dirty="0"/>
-          </a:p>
-        </p:txBody>
-      </p:sp>
-      <p:pic>
-        <p:nvPicPr>
-          <p:cNvPr id="5" name="Picture 5" descr="56"/>
-          <p:cNvPicPr>
-            <a:picLocks noChangeAspect="1" noChangeArrowheads="1"/>
-          </p:cNvPicPr>
-          <p:nvPr/>
-        </p:nvPicPr>
-        <p:blipFill>
-          <a:blip r:embed="rId3">
-            <a:extLst>
-              <a:ext uri="{28A0092B-C50C-407E-A947-70E740481C1C}">
-                <a14:useLocalDpi xmlns:a14="http://schemas.microsoft.com/office/drawing/2010/main" val="0"/>
-              </a:ext>
-            </a:extLst>
-          </a:blip>
-          <a:srcRect/>
-          <a:stretch>
-            <a:fillRect/>
-          </a:stretch>
-        </p:blipFill>
-        <p:spPr bwMode="auto">
-          <a:xfrm>
-            <a:off x="2346326" y="3910318"/>
-            <a:ext cx="4140200" cy="1003300"/>
-          </a:xfrm>
-          <a:prstGeom prst="rect">
-            <a:avLst/>
-          </a:prstGeom>
-          <a:noFill/>
-          <a:extLst>
-            <a:ext uri="{909E8E84-426E-40dd-AFC4-6F175D3DCCD1}">
-              <a14:hiddenFill xmlns:a14="http://schemas.microsoft.com/office/drawing/2010/main">
-                <a:solidFill>
-                  <a:srgbClr val="FFFFFF"/>
-                </a:solidFill>
-              </a14:hiddenFill>
-            </a:ext>
-          </a:extLst>
-        </p:spPr>
-      </p:pic>
-      <p:sp>
-        <p:nvSpPr>
-          <p:cNvPr id="6" name="ZoneTexte 5"/>
-          <p:cNvSpPr txBox="1"/>
-          <p:nvPr/>
-        </p:nvSpPr>
-        <p:spPr>
-          <a:xfrm>
-            <a:off x="901701" y="5217343"/>
-            <a:ext cx="7776663" cy="923330"/>
-          </a:xfrm>
-          <a:prstGeom prst="rect">
-            <a:avLst/>
-          </a:prstGeom>
-          <a:noFill/>
-        </p:spPr>
-        <p:txBody>
-          <a:bodyPr wrap="none" rtlCol="0">
-            <a:spAutoFit/>
-          </a:bodyPr>
-          <a:lstStyle/>
-          <a:p>
-            <a:r>
-              <a:rPr lang="fr-FR" dirty="0" smtClean="0"/>
-              <a:t>The </a:t>
-            </a:r>
-            <a:r>
-              <a:rPr lang="fr-FR" dirty="0" err="1" smtClean="0"/>
-              <a:t>resulting</a:t>
-            </a:r>
-            <a:r>
-              <a:rPr lang="fr-FR" dirty="0" smtClean="0"/>
-              <a:t> </a:t>
-            </a:r>
-            <a:r>
-              <a:rPr lang="fr-FR" dirty="0" err="1" smtClean="0"/>
-              <a:t>interpolated</a:t>
-            </a:r>
-            <a:r>
-              <a:rPr lang="fr-FR" dirty="0" smtClean="0"/>
-              <a:t> </a:t>
-            </a:r>
-            <a:r>
-              <a:rPr lang="fr-FR" dirty="0" err="1" smtClean="0"/>
-              <a:t>velocities</a:t>
-            </a:r>
-            <a:r>
-              <a:rPr lang="fr-FR" dirty="0" smtClean="0"/>
-              <a:t> are </a:t>
-            </a:r>
-            <a:r>
-              <a:rPr lang="fr-FR" dirty="0" err="1" smtClean="0"/>
-              <a:t>factored</a:t>
-            </a:r>
-            <a:r>
-              <a:rPr lang="fr-FR" dirty="0" smtClean="0"/>
-              <a:t> </a:t>
-            </a:r>
-            <a:r>
-              <a:rPr lang="fr-FR" dirty="0" err="1" smtClean="0"/>
-              <a:t>with</a:t>
-            </a:r>
-            <a:r>
-              <a:rPr lang="fr-FR" dirty="0" smtClean="0"/>
-              <a:t> simple </a:t>
-            </a:r>
-            <a:r>
-              <a:rPr lang="fr-FR" dirty="0" err="1" smtClean="0"/>
-              <a:t>arithmetic</a:t>
-            </a:r>
-            <a:r>
-              <a:rPr lang="fr-FR" dirty="0" smtClean="0"/>
-              <a:t> </a:t>
-            </a:r>
-            <a:r>
-              <a:rPr lang="fr-FR" dirty="0" err="1" smtClean="0"/>
-              <a:t>mean</a:t>
-            </a:r>
-            <a:r>
-              <a:rPr lang="fr-FR" dirty="0" smtClean="0"/>
-              <a:t> </a:t>
-            </a:r>
-          </a:p>
-          <a:p>
-            <a:r>
-              <a:rPr lang="fr-FR" dirty="0" smtClean="0"/>
-              <a:t>interpolations to </a:t>
-            </a:r>
-            <a:r>
-              <a:rPr lang="fr-FR" dirty="0" err="1" smtClean="0"/>
-              <a:t>compute</a:t>
-            </a:r>
-            <a:r>
-              <a:rPr lang="fr-FR" dirty="0" smtClean="0"/>
-              <a:t> the advection </a:t>
-            </a:r>
-            <a:r>
-              <a:rPr lang="fr-FR" dirty="0" err="1" smtClean="0"/>
-              <a:t>term</a:t>
-            </a:r>
-            <a:r>
-              <a:rPr lang="fr-FR" dirty="0" smtClean="0"/>
-              <a:t> in conservative </a:t>
-            </a:r>
-            <a:r>
-              <a:rPr lang="fr-FR" dirty="0" err="1" smtClean="0"/>
-              <a:t>form</a:t>
-            </a:r>
-            <a:r>
-              <a:rPr lang="fr-FR" dirty="0" smtClean="0"/>
-              <a:t> (conservative</a:t>
-            </a:r>
-          </a:p>
-          <a:p>
-            <a:r>
-              <a:rPr lang="fr-FR" dirty="0" smtClean="0"/>
-              <a:t>for constant </a:t>
-            </a:r>
-            <a:r>
-              <a:rPr lang="fr-FR" dirty="0" err="1" smtClean="0"/>
-              <a:t>density</a:t>
-            </a:r>
-            <a:r>
-              <a:rPr lang="fr-FR" dirty="0" smtClean="0"/>
-              <a:t> </a:t>
-            </a:r>
-            <a:r>
-              <a:rPr lang="fr-FR" dirty="0" err="1" smtClean="0"/>
-              <a:t>only</a:t>
-            </a:r>
-            <a:r>
-              <a:rPr lang="fr-FR" dirty="0" smtClean="0"/>
-              <a:t>).   </a:t>
-            </a:r>
-            <a:endParaRPr lang="fr-FR" dirty="0"/>
-          </a:p>
-        </p:txBody>
-      </p:sp>
-    </p:spTree>
-    <p:extLst>
-      <p:ext uri="{BB962C8B-B14F-4D97-AF65-F5344CB8AC3E}">
-        <p14:creationId xmlns:p14="http://schemas.microsoft.com/office/powerpoint/2010/main" val="3341056385"/>
-      </p:ext>
-    </p:extLst>
-  </p:cSld>
-  <p:clrMapOvr>
-    <a:masterClrMapping/>
-  </p:clrMapOvr>
-  <p:timing>
-    <p:tnLst>
-      <p:par>
-        <p:cTn xmlns:p14="http://schemas.microsoft.com/office/powerpoint/2010/main" id="1" dur="indefinite" restart="never" nodeType="tmRoot"/>
-      </p:par>
-    </p:tnLst>
-  </p:timing>
-</p:sld>
-</file>
-
-<file path=ppt/slides/slide12.xml><?xml version="1.0" encoding="utf-8"?>
 <p:sld xmlns:a="http://schemas.openxmlformats.org/drawingml/2006/main" xmlns:r="http://schemas.openxmlformats.org/officeDocument/2006/relationships" xmlns:p="http://schemas.openxmlformats.org/presentationml/2006/main">
   <p:cSld>
     <p:spTree>
@@ -4122,7 +3590,7 @@
 </p:sld>
 </file>
 
-<file path=ppt/slides/slide13.xml><?xml version="1.0" encoding="utf-8"?>
+<file path=ppt/slides/slide12.xml><?xml version="1.0" encoding="utf-8"?>
 <p:sld xmlns:a="http://schemas.openxmlformats.org/drawingml/2006/main" xmlns:r="http://schemas.openxmlformats.org/officeDocument/2006/relationships" xmlns:p="http://schemas.openxmlformats.org/presentationml/2006/main">
   <p:cSld>
     <p:spTree>
@@ -4299,7 +3767,7 @@
 </p:sld>
 </file>
 
-<file path=ppt/slides/slide14.xml><?xml version="1.0" encoding="utf-8"?>
+<file path=ppt/slides/slide13.xml><?xml version="1.0" encoding="utf-8"?>
 <p:sld xmlns:a="http://schemas.openxmlformats.org/drawingml/2006/main" xmlns:r="http://schemas.openxmlformats.org/officeDocument/2006/relationships" xmlns:p="http://schemas.openxmlformats.org/presentationml/2006/main">
   <p:cSld>
     <p:spTree>
@@ -4429,98 +3897,6 @@
 </p:sld>
 </file>
 
-<file path=ppt/slides/slide15.xml><?xml version="1.0" encoding="utf-8"?>
-<p:sld xmlns:a="http://schemas.openxmlformats.org/drawingml/2006/main" xmlns:r="http://schemas.openxmlformats.org/officeDocument/2006/relationships" xmlns:p="http://schemas.openxmlformats.org/presentationml/2006/main">
-  <p:cSld>
-    <p:spTree>
-      <p:nvGrpSpPr>
-        <p:cNvPr id="1" name=""/>
-        <p:cNvGrpSpPr/>
-        <p:nvPr/>
-      </p:nvGrpSpPr>
-      <p:grpSpPr>
-        <a:xfrm>
-          <a:off x="0" y="0"/>
-          <a:ext cx="0" cy="0"/>
-          <a:chOff x="0" y="0"/>
-          <a:chExt cx="0" cy="0"/>
-        </a:xfrm>
-      </p:grpSpPr>
-      <p:sp>
-        <p:nvSpPr>
-          <p:cNvPr id="2" name="ZoneTexte 1"/>
-          <p:cNvSpPr txBox="1"/>
-          <p:nvPr/>
-        </p:nvSpPr>
-        <p:spPr>
-          <a:xfrm>
-            <a:off x="1285569" y="2399026"/>
-            <a:ext cx="6763728" cy="369332"/>
-          </a:xfrm>
-          <a:prstGeom prst="rect">
-            <a:avLst/>
-          </a:prstGeom>
-          <a:noFill/>
-        </p:spPr>
-        <p:txBody>
-          <a:bodyPr wrap="none" rtlCol="0">
-            <a:spAutoFit/>
-          </a:bodyPr>
-          <a:lstStyle/>
-          <a:p>
-            <a:r>
-              <a:rPr lang="fr-FR" dirty="0" err="1" smtClean="0"/>
-              <a:t>Next</a:t>
-            </a:r>
-            <a:r>
-              <a:rPr lang="fr-FR" dirty="0" smtClean="0"/>
-              <a:t> goal: </a:t>
-            </a:r>
-            <a:r>
-              <a:rPr lang="fr-FR" dirty="0" err="1" smtClean="0"/>
-              <a:t>perform</a:t>
-            </a:r>
-            <a:r>
-              <a:rPr lang="fr-FR" dirty="0" smtClean="0"/>
-              <a:t> a large </a:t>
-            </a:r>
-            <a:r>
-              <a:rPr lang="fr-FR" dirty="0" err="1" smtClean="0"/>
-              <a:t>scale</a:t>
-            </a:r>
-            <a:r>
-              <a:rPr lang="fr-FR" dirty="0" smtClean="0"/>
-              <a:t> </a:t>
-            </a:r>
-            <a:r>
-              <a:rPr lang="fr-FR" dirty="0" err="1" smtClean="0"/>
-              <a:t>atomization</a:t>
-            </a:r>
-            <a:r>
-              <a:rPr lang="fr-FR" dirty="0" smtClean="0"/>
-              <a:t> simulation by end of </a:t>
-            </a:r>
-            <a:r>
-              <a:rPr lang="fr-FR" dirty="0" err="1" smtClean="0"/>
-              <a:t>year</a:t>
-            </a:r>
-            <a:endParaRPr lang="fr-FR" dirty="0"/>
-          </a:p>
-        </p:txBody>
-      </p:sp>
-    </p:spTree>
-    <p:extLst>
-      <p:ext uri="{BB962C8B-B14F-4D97-AF65-F5344CB8AC3E}">
-        <p14:creationId xmlns:p14="http://schemas.microsoft.com/office/powerpoint/2010/main" val="3355955992"/>
-      </p:ext>
-    </p:extLst>
-  </p:cSld>
-  <p:clrMapOvr>
-    <a:masterClrMapping/>
-  </p:clrMapOvr>
-</p:sld>
-</file>
-
 <file path=ppt/slides/slide2.xml><?xml version="1.0" encoding="utf-8"?>
 <p:sld xmlns:a="http://schemas.openxmlformats.org/drawingml/2006/main" xmlns:r="http://schemas.openxmlformats.org/officeDocument/2006/relationships" xmlns:p="http://schemas.openxmlformats.org/presentationml/2006/main">
   <p:cSld>
@@ -4547,7 +3923,7 @@
         <p:spPr>
           <a:xfrm>
             <a:off x="1160147" y="1144633"/>
-            <a:ext cx="5731181" cy="4247317"/>
+            <a:ext cx="5087150" cy="2585323"/>
           </a:xfrm>
           <a:prstGeom prst="rect">
             <a:avLst/>
@@ -4618,23 +3994,11 @@
           <a:p>
             <a:r>
               <a:rPr lang="fr-FR" dirty="0" smtClean="0"/>
-              <a:t>- </a:t>
-            </a:r>
-            <a:r>
-              <a:rPr lang="fr-FR" dirty="0" err="1" smtClean="0"/>
-              <a:t>Yours</a:t>
-            </a:r>
-            <a:r>
-              <a:rPr lang="fr-FR" dirty="0" smtClean="0"/>
-              <a:t> </a:t>
-            </a:r>
-            <a:r>
-              <a:rPr lang="fr-FR" dirty="0" err="1" smtClean="0"/>
-              <a:t>Truly</a:t>
-            </a:r>
-            <a:r>
-              <a:rPr lang="fr-FR" dirty="0" smtClean="0"/>
-              <a:t>, ∂</a:t>
+              <a:t>- Stéphane Zaleski, </a:t>
+            </a:r>
+            <a:r>
+              <a:rPr lang="fr-FR" dirty="0" smtClean="0"/>
+              <a:t>∂</a:t>
             </a:r>
             <a:r>
               <a:rPr lang="fr-FR" dirty="0"/>
@@ -4648,59 +4012,6 @@
             </a:r>
           </a:p>
           <a:p>
-            <a:endParaRPr lang="fr-FR" dirty="0"/>
-          </a:p>
-          <a:p>
-            <a:r>
-              <a:rPr lang="fr-FR" dirty="0" err="1" smtClean="0">
-                <a:effectLst/>
-              </a:rPr>
-              <a:t>Potential</a:t>
-            </a:r>
-            <a:r>
-              <a:rPr lang="fr-FR" dirty="0" smtClean="0">
-                <a:effectLst/>
-              </a:rPr>
-              <a:t> </a:t>
-            </a:r>
-            <a:r>
-              <a:rPr lang="fr-FR" dirty="0" err="1" smtClean="0">
-                <a:effectLst/>
-              </a:rPr>
-              <a:t>project</a:t>
-            </a:r>
-            <a:r>
-              <a:rPr lang="fr-FR" dirty="0" smtClean="0">
-                <a:effectLst/>
-              </a:rPr>
-              <a:t> participants (have </a:t>
-            </a:r>
-            <a:r>
-              <a:rPr lang="fr-FR" dirty="0" err="1" smtClean="0">
-                <a:effectLst/>
-              </a:rPr>
-              <a:t>agreed</a:t>
-            </a:r>
-            <a:r>
-              <a:rPr lang="fr-FR" dirty="0" smtClean="0">
-                <a:effectLst/>
-              </a:rPr>
-              <a:t> but not </a:t>
-            </a:r>
-            <a:r>
-              <a:rPr lang="fr-FR" dirty="0" err="1" smtClean="0">
-                <a:effectLst/>
-              </a:rPr>
-              <a:t>started</a:t>
-            </a:r>
-            <a:r>
-              <a:rPr lang="fr-FR" dirty="0" smtClean="0">
-                <a:effectLst/>
-              </a:rPr>
-              <a:t>)</a:t>
-            </a:r>
-          </a:p>
-          <a:p>
             <a:endParaRPr lang="fr-FR" dirty="0" smtClean="0">
               <a:effectLst/>
             </a:endParaRPr>
@@ -4751,46 +4062,13 @@
             </a:r>
             <a:r>
               <a:rPr lang="fr-FR" dirty="0" smtClean="0"/>
-              <a:t>, NJ, USA</a:t>
-            </a:r>
-          </a:p>
-          <a:p>
-            <a:endParaRPr lang="fr-FR" dirty="0"/>
-          </a:p>
-          <a:p>
-            <a:r>
-              <a:rPr lang="fr-FR" dirty="0" smtClean="0"/>
-              <a:t>May </a:t>
-            </a:r>
-            <a:r>
-              <a:rPr lang="fr-FR" dirty="0" err="1" smtClean="0"/>
-              <a:t>participate</a:t>
+              <a:t>, NJ, </a:t>
+            </a:r>
+            <a:r>
+              <a:rPr lang="fr-FR" dirty="0" smtClean="0"/>
+              <a:t>USA</a:t>
             </a:r>
             <a:endParaRPr lang="fr-FR" dirty="0" smtClean="0"/>
-          </a:p>
-          <a:p>
-            <a:endParaRPr lang="fr-FR" dirty="0"/>
-          </a:p>
-          <a:p>
-            <a:r>
-              <a:rPr lang="fr-FR" dirty="0" smtClean="0"/>
-              <a:t>- Pierre </a:t>
-            </a:r>
-            <a:r>
-              <a:rPr lang="fr-FR" dirty="0" err="1" smtClean="0"/>
-              <a:t>Sagaut</a:t>
-            </a:r>
-            <a:r>
-              <a:rPr lang="fr-FR" dirty="0" smtClean="0"/>
-              <a:t>, , ∂’Alembert</a:t>
-            </a:r>
-            <a:r>
-              <a:rPr lang="fr-FR" dirty="0" smtClean="0">
-                <a:effectLst/>
-              </a:rPr>
-              <a:t> </a:t>
-            </a:r>
-            <a:endParaRPr lang="fr-FR" dirty="0"/>
           </a:p>
         </p:txBody>
       </p:sp>
@@ -4804,6 +4082,13 @@
   <p:clrMapOvr>
     <a:masterClrMapping/>
   </p:clrMapOvr>
+  <p:timing>
+    <p:tnLst>
+      <p:par>
+        <p:cTn xmlns:p14="http://schemas.microsoft.com/office/powerpoint/2010/main" id="1" dur="indefinite" restart="never" nodeType="tmRoot"/>
+      </p:par>
+    </p:tnLst>
+  </p:timing>
 </p:sld>
 </file>
 
@@ -4832,8 +4117,8 @@
         </p:nvSpPr>
         <p:spPr>
           <a:xfrm>
-            <a:off x="1066081" y="1050554"/>
-            <a:ext cx="7337149" cy="5632312"/>
+            <a:off x="880219" y="1050554"/>
+            <a:ext cx="7337149" cy="5909311"/>
           </a:xfrm>
           <a:prstGeom prst="rect">
             <a:avLst/>
@@ -4860,15 +4145,7 @@
                   <a:srgbClr val="FF0000"/>
                 </a:solidFill>
               </a:rPr>
-              <a:t>: </a:t>
-            </a:r>
-            <a:r>
-              <a:rPr lang="fr-FR" dirty="0" smtClean="0">
-                <a:solidFill>
-                  <a:srgbClr val="FF0000"/>
-                </a:solidFill>
-              </a:rPr>
-              <a:t>  </a:t>
+              <a:t>:   </a:t>
             </a:r>
             <a:r>
               <a:rPr lang="fr-FR" dirty="0" err="1" smtClean="0">
@@ -5041,29 +4318,24 @@
               <a:rPr lang="fr-FR" dirty="0" smtClean="0"/>
               <a:t> </a:t>
             </a:r>
-            <a:r>
-              <a:rPr lang="fr-FR" dirty="0" err="1" smtClean="0"/>
-              <a:t>compared</a:t>
-            </a:r>
-            <a:r>
-              <a:rPr lang="fr-FR" dirty="0" smtClean="0"/>
-              <a:t> to Gerris </a:t>
-            </a:r>
+            <a:endParaRPr lang="fr-FR" dirty="0" smtClean="0"/>
+          </a:p>
+          <a:p>
             <a:r>
               <a:rPr lang="fr-FR" dirty="0" err="1" smtClean="0"/>
               <a:t>thanks</a:t>
             </a:r>
             <a:r>
               <a:rPr lang="fr-FR" dirty="0" smtClean="0"/>
-              <a:t> to a </a:t>
-            </a:r>
-            <a:r>
-              <a:rPr lang="fr-FR" dirty="0" err="1" smtClean="0"/>
-              <a:t>simpler</a:t>
-            </a:r>
-            <a:r>
-              <a:rPr lang="fr-FR" dirty="0" smtClean="0"/>
-              <a:t> </a:t>
+              <a:t> </a:t>
+            </a:r>
+            <a:r>
+              <a:rPr lang="fr-FR" dirty="0" smtClean="0"/>
+              <a:t>to a </a:t>
+            </a:r>
+            <a:r>
+              <a:rPr lang="fr-FR" dirty="0" smtClean="0"/>
+              <a:t>simple </a:t>
             </a:r>
             <a:r>
               <a:rPr lang="fr-FR" dirty="0" err="1" smtClean="0"/>
@@ -5104,24 +4376,20 @@
           </a:p>
           <a:p>
             <a:r>
-              <a:rPr lang="fr-FR" dirty="0" smtClean="0"/>
-              <a:t>Will </a:t>
-            </a:r>
-            <a:r>
-              <a:rPr lang="fr-FR" dirty="0" err="1" smtClean="0"/>
-              <a:t>be</a:t>
-            </a:r>
-            <a:r>
-              <a:rPr lang="fr-FR" dirty="0" smtClean="0"/>
-              <a:t> </a:t>
-            </a:r>
-            <a:r>
-              <a:rPr lang="fr-FR" dirty="0" err="1" smtClean="0"/>
-              <a:t>released</a:t>
-            </a:r>
-            <a:r>
-              <a:rPr lang="fr-FR" dirty="0" smtClean="0"/>
-              <a:t> as a free code </a:t>
+              <a:rPr lang="fr-FR" dirty="0" err="1"/>
+              <a:t>R</a:t>
+            </a:r>
+            <a:r>
+              <a:rPr lang="fr-FR" dirty="0" err="1" smtClean="0"/>
+              <a:t>eleased</a:t>
+            </a:r>
+            <a:r>
+              <a:rPr lang="fr-FR" dirty="0" smtClean="0"/>
+              <a:t> </a:t>
+            </a:r>
+            <a:r>
+              <a:rPr lang="fr-FR" dirty="0" smtClean="0"/>
+              <a:t>as a free code </a:t>
             </a:r>
             <a:r>
               <a:rPr lang="fr-FR" dirty="0" err="1" smtClean="0"/>
@@ -5168,23 +4436,23 @@
           <a:p>
             <a:r>
               <a:rPr lang="fr-FR" dirty="0" smtClean="0"/>
-              <a:t>20% on Surfer, by </a:t>
-            </a:r>
-            <a:r>
-              <a:rPr lang="fr-FR" dirty="0" err="1" smtClean="0"/>
-              <a:t>Yours</a:t>
-            </a:r>
-            <a:r>
-              <a:rPr lang="fr-FR" dirty="0" smtClean="0"/>
-              <a:t> </a:t>
-            </a:r>
-            <a:r>
-              <a:rPr lang="fr-FR" dirty="0" err="1" smtClean="0"/>
-              <a:t>Truly</a:t>
-            </a:r>
-            <a:r>
-              <a:rPr lang="fr-FR" dirty="0" smtClean="0"/>
-              <a:t>, Ruben Scardovelli, </a:t>
+              <a:t>20% on Surfer, </a:t>
+            </a:r>
+            <a:r>
+              <a:rPr lang="fr-FR" dirty="0" smtClean="0"/>
+              <a:t>by </a:t>
+            </a:r>
+            <a:r>
+              <a:rPr lang="fr-FR" dirty="0" err="1" smtClean="0"/>
+              <a:t>Stephane</a:t>
+            </a:r>
+            <a:r>
+              <a:rPr lang="fr-FR" dirty="0" smtClean="0"/>
+              <a:t> Zaleski, </a:t>
+            </a:r>
+            <a:r>
+              <a:rPr lang="fr-FR" dirty="0" smtClean="0"/>
+              <a:t>Ruben Scardovelli, </a:t>
             </a:r>
             <a:r>
               <a:rPr lang="fr-FR" dirty="0" err="1" smtClean="0"/>
@@ -5229,6 +4497,13 @@
   <p:clrMapOvr>
     <a:masterClrMapping/>
   </p:clrMapOvr>
+  <p:timing>
+    <p:tnLst>
+      <p:par>
+        <p:cTn xmlns:p14="http://schemas.microsoft.com/office/powerpoint/2010/main" id="1" dur="indefinite" restart="never" nodeType="tmRoot"/>
+      </p:par>
+    </p:tnLst>
+  </p:timing>
 </p:sld>
 </file>
 
@@ -5347,11 +4622,7 @@
             </a:r>
             <a:r>
               <a:rPr lang="fr-FR" dirty="0" smtClean="0"/>
-              <a:t> </a:t>
-            </a:r>
-            <a:r>
-              <a:rPr lang="fr-FR" dirty="0" smtClean="0"/>
-              <a:t>x, y, z </a:t>
+              <a:t> x, y, z </a:t>
             </a:r>
             <a:r>
               <a:rPr lang="fr-FR" dirty="0" err="1" smtClean="0"/>
@@ -5413,11 +4684,7 @@
             </a:r>
             <a:r>
               <a:rPr lang="fr-FR" dirty="0" smtClean="0"/>
-              <a:t> for VOF</a:t>
-            </a:r>
-            <a:r>
-              <a:rPr lang="fr-FR" dirty="0" smtClean="0"/>
-              <a:t>)</a:t>
+              <a:t> for VOF)</a:t>
             </a:r>
           </a:p>
           <a:p>
@@ -5436,7 +4703,6 @@
               <a:rPr lang="fr-FR" dirty="0" smtClean="0"/>
               <a:t>.</a:t>
             </a:r>
-            <a:endParaRPr lang="fr-FR" dirty="0" smtClean="0"/>
           </a:p>
           <a:p>
             <a:endParaRPr lang="fr-FR" dirty="0"/>
@@ -5444,11 +4710,7 @@
           <a:p>
             <a:r>
               <a:rPr lang="fr-FR" dirty="0" smtClean="0"/>
-              <a:t>- </a:t>
-            </a:r>
-            <a:r>
-              <a:rPr lang="fr-FR" dirty="0" smtClean="0"/>
-              <a:t> Time </a:t>
+              <a:t>-  Time </a:t>
             </a:r>
             <a:r>
               <a:rPr lang="fr-FR" dirty="0" err="1" smtClean="0"/>
@@ -5525,7 +4787,11 @@
             </a:r>
             <a:r>
               <a:rPr lang="fr-FR" dirty="0" smtClean="0"/>
-              <a:t> by ENO  (</a:t>
+              <a:t> by </a:t>
+            </a:r>
+            <a:r>
+              <a:rPr lang="fr-FR" dirty="0" smtClean="0"/>
+              <a:t>QUICK (</a:t>
             </a:r>
             <a:r>
               <a:rPr lang="fr-FR" dirty="0" err="1" smtClean="0"/>
@@ -5550,7 +4816,19 @@
           <a:p>
             <a:r>
               <a:rPr lang="fr-FR" dirty="0" smtClean="0"/>
-              <a:t>- explicit </a:t>
+              <a:t>- </a:t>
+            </a:r>
+            <a:r>
+              <a:rPr lang="fr-FR" dirty="0" smtClean="0"/>
+              <a:t>explicit or </a:t>
+            </a:r>
+            <a:r>
+              <a:rPr lang="fr-FR" dirty="0" err="1" smtClean="0"/>
+              <a:t>implicit</a:t>
+            </a:r>
+            <a:r>
+              <a:rPr lang="fr-FR" dirty="0" smtClean="0"/>
+              <a:t> </a:t>
             </a:r>
             <a:r>
               <a:rPr lang="fr-FR" dirty="0" err="1" smtClean="0"/>
@@ -5587,19 +4865,15 @@
             </a:r>
             <a:r>
               <a:rPr lang="fr-FR" dirty="0" err="1" smtClean="0"/>
-              <a:t>shall</a:t>
-            </a:r>
-            <a:r>
-              <a:rPr lang="fr-FR" dirty="0" smtClean="0"/>
-              <a:t> </a:t>
-            </a:r>
-            <a:r>
-              <a:rPr lang="fr-FR" dirty="0" err="1" smtClean="0"/>
               <a:t>just</a:t>
             </a:r>
             <a:r>
               <a:rPr lang="fr-FR" dirty="0" smtClean="0"/>
-              <a:t> use the </a:t>
+              <a:t> </a:t>
+            </a:r>
+            <a:r>
+              <a:rPr lang="fr-FR" dirty="0" smtClean="0"/>
+              <a:t>use the </a:t>
             </a:r>
             <a:r>
               <a:rPr lang="fr-FR" dirty="0" err="1" smtClean="0"/>
@@ -6030,7 +5304,7 @@
         <p:spPr>
           <a:xfrm>
             <a:off x="611429" y="3324141"/>
-            <a:ext cx="6782551" cy="2031325"/>
+            <a:ext cx="7218630" cy="2031325"/>
           </a:xfrm>
           <a:prstGeom prst="rect">
             <a:avLst/>
@@ -6128,7 +5402,11 @@
             </a:r>
             <a:r>
               <a:rPr lang="fr-FR" dirty="0" smtClean="0"/>
-              <a:t> (in FTC3D2011, </a:t>
+              <a:t> </a:t>
+            </a:r>
+            <a:r>
+              <a:rPr lang="fr-FR" dirty="0" smtClean="0"/>
+              <a:t>or </a:t>
             </a:r>
             <a:r>
               <a:rPr lang="fr-FR" dirty="0" err="1" smtClean="0"/>
@@ -6136,31 +5414,39 @@
             </a:r>
             <a:r>
               <a:rPr lang="fr-FR" dirty="0" smtClean="0"/>
-              <a:t> </a:t>
-            </a:r>
-            <a:r>
-              <a:rPr lang="fr-FR" dirty="0" err="1" smtClean="0"/>
-              <a:t>is</a:t>
-            </a:r>
-            <a:r>
-              <a:rPr lang="fr-FR" dirty="0" smtClean="0"/>
-              <a:t> </a:t>
-            </a:r>
-            <a:r>
-              <a:rPr lang="fr-FR" dirty="0" err="1" smtClean="0"/>
-              <a:t>also</a:t>
-            </a:r>
-            <a:r>
-              <a:rPr lang="fr-FR" dirty="0" smtClean="0"/>
-              <a:t> </a:t>
-            </a:r>
-            <a:r>
-              <a:rPr lang="fr-FR" dirty="0" err="1" smtClean="0"/>
-              <a:t>available</a:t>
-            </a:r>
-            <a:r>
-              <a:rPr lang="fr-FR" dirty="0" smtClean="0"/>
-              <a:t>)</a:t>
+              <a:t> (</a:t>
+            </a:r>
+            <a:r>
+              <a:rPr lang="fr-FR" dirty="0" err="1" smtClean="0"/>
+              <a:t>tecplot</a:t>
+            </a:r>
+            <a:r>
+              <a:rPr lang="fr-FR" dirty="0" smtClean="0"/>
+              <a:t> </a:t>
+            </a:r>
+            <a:r>
+              <a:rPr lang="fr-FR" dirty="0" err="1" smtClean="0"/>
+              <a:t>should</a:t>
+            </a:r>
+            <a:r>
+              <a:rPr lang="fr-FR" dirty="0" smtClean="0"/>
+              <a:t> </a:t>
+            </a:r>
+            <a:r>
+              <a:rPr lang="fr-FR" dirty="0" err="1" smtClean="0"/>
+              <a:t>be</a:t>
+            </a:r>
+            <a:r>
+              <a:rPr lang="fr-FR" dirty="0" smtClean="0"/>
+              <a:t> </a:t>
+            </a:r>
+            <a:r>
+              <a:rPr lang="fr-FR" dirty="0" err="1" smtClean="0"/>
+              <a:t>added</a:t>
+            </a:r>
+            <a:r>
+              <a:rPr lang="fr-FR" dirty="0" smtClean="0"/>
+              <a:t> for VOF)</a:t>
             </a:r>
             <a:endParaRPr lang="fr-FR" dirty="0"/>
           </a:p>
@@ -6212,7 +5498,7 @@
         <p:spPr>
           <a:xfrm>
             <a:off x="595751" y="486075"/>
-            <a:ext cx="7838835" cy="3139321"/>
+            <a:ext cx="7838835" cy="2862323"/>
           </a:xfrm>
           <a:prstGeom prst="rect">
             <a:avLst/>
@@ -6244,7 +5530,35 @@
           <a:p>
             <a:r>
               <a:rPr lang="fr-FR" dirty="0" smtClean="0"/>
-              <a:t>- Code in Fortran90 but </a:t>
+              <a:t>- </a:t>
+            </a:r>
+            <a:r>
+              <a:rPr lang="fr-FR" dirty="0" smtClean="0"/>
+              <a:t>Code </a:t>
+            </a:r>
+            <a:r>
+              <a:rPr lang="fr-FR" dirty="0" err="1" smtClean="0"/>
+              <a:t>entirely</a:t>
+            </a:r>
+            <a:r>
+              <a:rPr lang="fr-FR" dirty="0" smtClean="0"/>
+              <a:t> </a:t>
+            </a:r>
+            <a:r>
+              <a:rPr lang="fr-FR" dirty="0" smtClean="0"/>
+              <a:t>in </a:t>
+            </a:r>
+            <a:r>
+              <a:rPr lang="fr-FR" dirty="0" smtClean="0"/>
+              <a:t>Fortran90 </a:t>
+            </a:r>
+            <a:r>
+              <a:rPr lang="fr-FR" dirty="0" err="1" smtClean="0"/>
+              <a:t>except</a:t>
+            </a:r>
+            <a:r>
+              <a:rPr lang="fr-FR" dirty="0" smtClean="0"/>
+              <a:t> for </a:t>
             </a:r>
             <a:r>
               <a:rPr lang="fr-FR" dirty="0" err="1" smtClean="0"/>
@@ -6252,31 +5566,15 @@
             </a:r>
             <a:r>
               <a:rPr lang="fr-FR" dirty="0" smtClean="0"/>
-              <a:t> calls to C </a:t>
-            </a:r>
-            <a:r>
-              <a:rPr lang="fr-FR" dirty="0" err="1" smtClean="0"/>
-              <a:t>functions</a:t>
-            </a:r>
-            <a:r>
-              <a:rPr lang="fr-FR" dirty="0" smtClean="0"/>
-              <a:t> (</a:t>
-            </a:r>
-            <a:r>
-              <a:rPr lang="fr-FR" dirty="0" err="1" smtClean="0"/>
-              <a:t>serious</a:t>
-            </a:r>
-            <a:r>
-              <a:rPr lang="fr-FR" dirty="0" smtClean="0"/>
-              <a:t> </a:t>
-            </a:r>
-            <a:r>
-              <a:rPr lang="fr-FR" dirty="0" err="1" smtClean="0"/>
-              <a:t>portability</a:t>
-            </a:r>
-            <a:r>
-              <a:rPr lang="fr-FR" dirty="0" smtClean="0"/>
-              <a:t> issues)</a:t>
+              <a:t> test scripts </a:t>
+            </a:r>
+            <a:r>
+              <a:rPr lang="fr-FR" dirty="0" err="1" smtClean="0"/>
+              <a:t>outside</a:t>
+            </a:r>
+            <a:r>
+              <a:rPr lang="fr-FR" dirty="0" smtClean="0"/>
+              <a:t> of the main code.</a:t>
             </a:r>
           </a:p>
           <a:p>
@@ -6285,11 +5583,7 @@
           <a:p>
             <a:r>
               <a:rPr lang="fr-FR" dirty="0" smtClean="0"/>
-              <a:t>- </a:t>
-            </a:r>
-            <a:r>
-              <a:rPr lang="fr-FR" dirty="0" smtClean="0"/>
-              <a:t>All of FTC3D2011 (base version </a:t>
+              <a:t>- All of FTC3D2011 (base version </a:t>
             </a:r>
             <a:r>
               <a:rPr lang="fr-FR" dirty="0" err="1" smtClean="0"/>
@@ -6329,17 +5623,23 @@
             </a:r>
             <a:r>
               <a:rPr lang="fr-FR" dirty="0" smtClean="0"/>
-              <a:t> f90 files !</a:t>
-            </a:r>
-          </a:p>
-          <a:p>
+              <a:t> f90 files </a:t>
+            </a:r>
+            <a:r>
+              <a:rPr lang="fr-FR" dirty="0" smtClean="0"/>
+              <a:t>! </a:t>
+            </a:r>
             <a:r>
               <a:rPr lang="fr-FR" dirty="0" err="1" smtClean="0"/>
               <a:t>Choice</a:t>
             </a:r>
             <a:r>
               <a:rPr lang="fr-FR" dirty="0" smtClean="0"/>
-              <a:t> made to </a:t>
+              <a:t> </a:t>
+            </a:r>
+            <a:r>
+              <a:rPr lang="fr-FR" dirty="0" smtClean="0"/>
+              <a:t>made to </a:t>
             </a:r>
             <a:r>
               <a:rPr lang="fr-FR" dirty="0" err="1" smtClean="0"/>
@@ -6388,7 +5688,31 @@
             </a:r>
             <a:r>
               <a:rPr lang="fr-FR" dirty="0" smtClean="0"/>
-              <a:t>. But f90 compilation </a:t>
+              <a:t>. </a:t>
+            </a:r>
+            <a:r>
+              <a:rPr lang="fr-FR" dirty="0" smtClean="0"/>
+              <a:t>But C </a:t>
+            </a:r>
+            <a:r>
+              <a:rPr lang="fr-FR" dirty="0" err="1" smtClean="0"/>
+              <a:t>users</a:t>
+            </a:r>
+            <a:r>
+              <a:rPr lang="fr-FR" dirty="0" smtClean="0"/>
+              <a:t> </a:t>
+            </a:r>
+            <a:r>
+              <a:rPr lang="fr-FR" dirty="0" err="1" smtClean="0"/>
+              <a:t>beware</a:t>
+            </a:r>
+            <a:r>
+              <a:rPr lang="fr-FR" dirty="0" smtClean="0"/>
+              <a:t>, </a:t>
+            </a:r>
+            <a:r>
+              <a:rPr lang="fr-FR" dirty="0" smtClean="0"/>
+              <a:t>f90 compilation </a:t>
             </a:r>
             <a:r>
               <a:rPr lang="fr-FR" dirty="0" err="1" smtClean="0"/>
@@ -6466,7 +5790,7 @@
         <p:spPr>
           <a:xfrm>
             <a:off x="203809" y="856356"/>
-            <a:ext cx="8497297" cy="6001644"/>
+            <a:ext cx="8497297" cy="4524316"/>
           </a:xfrm>
           <a:prstGeom prst="rect">
             <a:avLst/>
@@ -6505,116 +5829,16 @@
           </a:p>
           <a:p>
             <a:r>
-              <a:rPr lang="fr-FR" sz="1600" dirty="0"/>
-              <a:t># </a:t>
-            </a:r>
-            <a:r>
-              <a:rPr lang="fr-FR" sz="1600" dirty="0" err="1" smtClean="0"/>
-              <a:t>babbage</a:t>
-            </a:r>
-            <a:r>
               <a:rPr lang="fr-FR" sz="1600" dirty="0" smtClean="0"/>
-              <a:t> has </a:t>
-            </a:r>
-            <a:r>
-              <a:rPr lang="fr-FR" sz="1600" dirty="0" err="1" smtClean="0"/>
-              <a:t>several</a:t>
-            </a:r>
-            <a:r>
-              <a:rPr lang="fr-FR" sz="1600" dirty="0" smtClean="0"/>
-              <a:t> fortran </a:t>
-            </a:r>
-            <a:r>
-              <a:rPr lang="fr-FR" sz="1600" dirty="0" err="1" smtClean="0"/>
-              <a:t>compilers</a:t>
-            </a:r>
+              <a:t>FC </a:t>
+            </a:r>
+            <a:r>
+              <a:rPr lang="fr-FR" sz="1600" dirty="0"/>
+              <a:t>= mpif90</a:t>
+            </a:r>
+          </a:p>
+          <a:p>
             <a:endParaRPr lang="fr-FR" sz="1600" dirty="0"/>
-          </a:p>
-          <a:p>
-            <a:r>
-              <a:rPr lang="fr-FR" sz="1600" dirty="0"/>
-              <a:t>OMPI_FC=gfortran44</a:t>
-            </a:r>
-          </a:p>
-          <a:p>
-            <a:endParaRPr lang="fr-FR" sz="1600" dirty="0"/>
-          </a:p>
-          <a:p>
-            <a:r>
-              <a:rPr lang="fr-FR" sz="1600" dirty="0"/>
-              <a:t>FC = mpif90</a:t>
-            </a:r>
-          </a:p>
-          <a:p>
-            <a:r>
-              <a:rPr lang="fr-FR" sz="1600" dirty="0"/>
-              <a:t>CC = </a:t>
-            </a:r>
-            <a:r>
-              <a:rPr lang="fr-FR" sz="1600" dirty="0" err="1"/>
-              <a:t>mpicc</a:t>
-            </a:r>
-            <a:endParaRPr lang="fr-FR" sz="1600" dirty="0"/>
-          </a:p>
-          <a:p>
-            <a:endParaRPr lang="fr-FR" sz="1600" dirty="0"/>
-          </a:p>
-          <a:p>
-            <a:r>
-              <a:rPr lang="fr-FR" sz="1600" dirty="0"/>
-              <a:t># </a:t>
-            </a:r>
-            <a:r>
-              <a:rPr lang="fr-FR" sz="1600" dirty="0" err="1"/>
-              <a:t>remove</a:t>
-            </a:r>
-            <a:r>
-              <a:rPr lang="fr-FR" sz="1600" dirty="0"/>
-              <a:t> </a:t>
-            </a:r>
-            <a:r>
-              <a:rPr lang="fr-FR" sz="1600" dirty="0" err="1"/>
-              <a:t>funny</a:t>
-            </a:r>
-            <a:r>
-              <a:rPr lang="fr-FR" sz="1600" dirty="0"/>
-              <a:t> </a:t>
-            </a:r>
-            <a:r>
-              <a:rPr lang="fr-FR" sz="1600" dirty="0" err="1"/>
-              <a:t>cflags</a:t>
-            </a:r>
-            <a:r>
-              <a:rPr lang="fr-FR" sz="1600" dirty="0"/>
-              <a:t> </a:t>
-            </a:r>
-            <a:r>
-              <a:rPr lang="fr-FR" sz="1600" dirty="0" err="1"/>
-              <a:t>from</a:t>
-            </a:r>
-            <a:r>
-              <a:rPr lang="fr-FR" sz="1600" dirty="0"/>
-              <a:t> gerris in </a:t>
-            </a:r>
-            <a:r>
-              <a:rPr lang="fr-FR" sz="1600" dirty="0" err="1"/>
-              <a:t>my</a:t>
-            </a:r>
-            <a:r>
-              <a:rPr lang="fr-FR" sz="1600" dirty="0"/>
-              <a:t> </a:t>
-            </a:r>
-            <a:r>
-              <a:rPr lang="fr-FR" sz="1600" dirty="0" err="1"/>
-              <a:t>environment</a:t>
-            </a:r>
-            <a:endParaRPr lang="fr-FR" sz="1600" dirty="0"/>
-          </a:p>
-          <a:p>
-            <a:r>
-              <a:rPr lang="fr-FR" sz="1600" dirty="0"/>
-              <a:t>CFLAGS = </a:t>
-            </a:r>
           </a:p>
           <a:p>
             <a:endParaRPr lang="fr-FR" sz="1600" dirty="0"/>
@@ -6892,7 +6116,7 @@
         <p:spPr>
           <a:xfrm>
             <a:off x="0" y="1348472"/>
-            <a:ext cx="9131126" cy="5262980"/>
+            <a:ext cx="8197476" cy="5262980"/>
           </a:xfrm>
           <a:prstGeom prst="rect">
             <a:avLst/>
@@ -6914,19 +6138,11 @@
               <a:t>= </a:t>
             </a:r>
             <a:r>
-              <a:rPr lang="fr-FR" sz="1600" dirty="0" err="1"/>
+              <a:rPr lang="fr-FR" sz="1600" dirty="0" err="1" smtClean="0"/>
               <a:t>paris.o</a:t>
             </a:r>
             <a:r>
-              <a:rPr lang="fr-FR" sz="1600" dirty="0"/>
-              <a:t> </a:t>
-            </a:r>
-            <a:r>
-              <a:rPr lang="fr-FR" sz="1600" dirty="0" err="1"/>
-              <a:t>utilc.o</a:t>
-            </a:r>
-            <a:r>
-              <a:rPr lang="fr-FR" sz="1600" dirty="0"/>
+              <a:rPr lang="fr-FR" sz="1600" dirty="0" smtClean="0"/>
               <a:t> </a:t>
             </a:r>
             <a:r>
@@ -6938,8 +6154,24 @@
               <a:t> </a:t>
             </a:r>
             <a:r>
+              <a:rPr lang="fr-FR" sz="1600" dirty="0" err="1" smtClean="0"/>
+              <a:t>modules.o</a:t>
+            </a:r>
+            <a:r>
+              <a:rPr lang="fr-FR" sz="1600" dirty="0"/>
+              <a:t> </a:t>
+            </a:r>
+            <a:r>
               <a:rPr lang="fr-FR" sz="1600" dirty="0" err="1"/>
-              <a:t>modules.o</a:t>
+              <a:t>vofmodules.o</a:t>
+            </a:r>
+            <a:r>
+              <a:rPr lang="fr-FR" sz="1600" dirty="0"/>
+              <a:t> </a:t>
+            </a:r>
+            <a:r>
+              <a:rPr lang="fr-FR" sz="1600" dirty="0" err="1"/>
+              <a:t>front.o</a:t>
             </a:r>
             <a:endParaRPr lang="fr-FR" sz="1600" dirty="0"/>
           </a:p>
@@ -7092,15 +6324,7 @@
             </a:r>
             <a:r>
               <a:rPr lang="fr-FR" sz="1600" dirty="0"/>
-              <a:t> paris *.</a:t>
-            </a:r>
-            <a:r>
-              <a:rPr lang="fr-FR" sz="1600" dirty="0" err="1"/>
-              <a:t>gz</a:t>
-            </a:r>
-            <a:r>
-              <a:rPr lang="fr-FR" sz="1600" dirty="0"/>
-              <a:t> </a:t>
+              <a:t> paris </a:t>
             </a:r>
             <a:r>
               <a:rPr lang="fr-FR" sz="1600" dirty="0" err="1"/>
@@ -7120,14 +6344,6 @@
             </a:r>
             <a:r>
               <a:rPr lang="fr-FR" sz="1600" dirty="0" err="1"/>
-              <a:t>stats</a:t>
-            </a:r>
-            <a:r>
-              <a:rPr lang="fr-FR" sz="1600" dirty="0"/>
-              <a:t> </a:t>
-            </a:r>
-            <a:r>
-              <a:rPr lang="fr-FR" sz="1600" dirty="0" err="1"/>
               <a:t>errftc</a:t>
             </a:r>
             <a:r>
@@ -7156,7 +6372,7 @@
             </a:r>
             <a:r>
               <a:rPr lang="fr-FR" sz="1600" dirty="0"/>
-              <a:t> TAGS tags </a:t>
+              <a:t> </a:t>
             </a:r>
             <a:r>
               <a:rPr lang="fr-FR" sz="1600" dirty="0" err="1"/>
@@ -7164,21 +6380,32 @@
             </a:r>
             <a:r>
               <a:rPr lang="fr-FR" sz="1600" dirty="0"/>
-              <a:t>.*</a:t>
-            </a:r>
-          </a:p>
-          <a:p>
-            <a:r>
-              <a:rPr lang="fr-FR" sz="1600" dirty="0"/>
-              <a:t>	@cd </a:t>
+              <a:t>.* </a:t>
             </a:r>
             <a:r>
               <a:rPr lang="fr-FR" sz="1600" dirty="0" err="1"/>
-              <a:t>Speed_Measurement</a:t>
-            </a:r>
-            <a:r>
-              <a:rPr lang="fr-FR" sz="1600" dirty="0"/>
-              <a:t>; </a:t>
+              <a:t>statsbub</a:t>
+            </a:r>
+            <a:endParaRPr lang="fr-FR" sz="1600" dirty="0"/>
+          </a:p>
+          <a:p>
+            <a:r>
+              <a:rPr lang="fr-FR" sz="1600" dirty="0"/>
+              <a:t>	@cd Tests; sh ./</a:t>
+            </a:r>
+            <a:r>
+              <a:rPr lang="fr-FR" sz="1600" dirty="0" err="1"/>
+              <a:t>clean.sh</a:t>
+            </a:r>
+            <a:r>
+              <a:rPr lang="fr-FR" sz="1600" dirty="0"/>
+              <a:t>; cd ..</a:t>
+            </a:r>
+          </a:p>
+          <a:p>
+            <a:r>
+              <a:rPr lang="fr-FR" sz="1600" dirty="0"/>
+              <a:t>	@cd Documentation; </a:t>
             </a:r>
             <a:r>
               <a:rPr lang="fr-FR" sz="1600" dirty="0" err="1"/>
@@ -7190,98 +6417,89 @@
             </a:r>
           </a:p>
           <a:p>
-            <a:r>
-              <a:rPr lang="fr-FR" sz="1600" dirty="0"/>
-              <a:t>	@cd </a:t>
-            </a:r>
-            <a:r>
-              <a:rPr lang="fr-FR" sz="1600" dirty="0" err="1"/>
-              <a:t>Poiseuille_Test</a:t>
-            </a:r>
-            <a:r>
-              <a:rPr lang="fr-FR" sz="1600" dirty="0"/>
-              <a:t>; </a:t>
-            </a:r>
-            <a:r>
-              <a:rPr lang="fr-FR" sz="1600" dirty="0" err="1"/>
-              <a:t>make</a:t>
-            </a:r>
-            <a:r>
-              <a:rPr lang="fr-FR" sz="1600" dirty="0"/>
-              <a:t> clean; cd ..</a:t>
-            </a:r>
-          </a:p>
-          <a:p>
             <a:endParaRPr lang="fr-FR" sz="1600" dirty="0"/>
           </a:p>
           <a:p>
             <a:r>
               <a:rPr lang="fr-FR" sz="1600" dirty="0"/>
-              <a:t>test:	</a:t>
+              <a:t>test:  </a:t>
             </a:r>
             <a:r>
               <a:rPr lang="fr-FR" sz="1600" dirty="0" err="1"/>
               <a:t>install</a:t>
             </a:r>
+            <a:r>
+              <a:rPr lang="fr-FR" sz="1600" dirty="0"/>
+              <a:t> compare</a:t>
+            </a:r>
+          </a:p>
+          <a:p>
+            <a:r>
+              <a:rPr lang="fr-FR" sz="1600" dirty="0"/>
+              <a:t>	@</a:t>
+            </a:r>
+            <a:r>
+              <a:rPr lang="fr-FR" sz="1600" dirty="0" err="1"/>
+              <a:t>echo</a:t>
+            </a:r>
+            <a:r>
+              <a:rPr lang="fr-FR" sz="1600" dirty="0"/>
+              <a:t> "This test </a:t>
+            </a:r>
+            <a:r>
+              <a:rPr lang="fr-FR" sz="1600" dirty="0" err="1"/>
+              <a:t>takes</a:t>
+            </a:r>
+            <a:r>
+              <a:rPr lang="fr-FR" sz="1600" dirty="0"/>
+              <a:t> </a:t>
+            </a:r>
+            <a:r>
+              <a:rPr lang="fr-FR" sz="1600" dirty="0" err="1"/>
+              <a:t>approximately</a:t>
+            </a:r>
+            <a:r>
+              <a:rPr lang="fr-FR" sz="1600" dirty="0"/>
+              <a:t> 1 minute on a 4-core </a:t>
+            </a:r>
+            <a:r>
+              <a:rPr lang="fr-FR" sz="1600" dirty="0" err="1"/>
+              <a:t>intel</a:t>
+            </a:r>
+            <a:r>
+              <a:rPr lang="fr-FR" sz="1600" dirty="0"/>
+              <a:t> i7 </a:t>
+            </a:r>
+            <a:r>
+              <a:rPr lang="fr-FR" sz="1600" dirty="0" err="1"/>
+              <a:t>MacBookPro</a:t>
+            </a:r>
+            <a:r>
+              <a:rPr lang="fr-FR" sz="1600" dirty="0"/>
+              <a:t>"</a:t>
+            </a:r>
+          </a:p>
+          <a:p>
+            <a:r>
+              <a:rPr lang="fr-FR" sz="1600" dirty="0"/>
+              <a:t>	@cd Tests; chmod +x ./</a:t>
+            </a:r>
+            <a:r>
+              <a:rPr lang="fr-FR" sz="1600" dirty="0" err="1"/>
+              <a:t>runtests.sh</a:t>
+            </a:r>
+            <a:r>
+              <a:rPr lang="fr-FR" sz="1600" dirty="0"/>
+              <a:t>; ./</a:t>
+            </a:r>
+            <a:r>
+              <a:rPr lang="fr-FR" sz="1600" dirty="0" err="1"/>
+              <a:t>runtests.sh</a:t>
+            </a:r>
             <a:endParaRPr lang="fr-FR" sz="1600" dirty="0"/>
           </a:p>
           <a:p>
-            <a:r>
-              <a:rPr lang="fr-FR" sz="1600" dirty="0"/>
-              <a:t>	@</a:t>
-            </a:r>
-            <a:r>
-              <a:rPr lang="fr-FR" sz="1600" dirty="0" err="1"/>
-              <a:t>rm</a:t>
-            </a:r>
-            <a:r>
-              <a:rPr lang="fr-FR" sz="1600" dirty="0"/>
-              <a:t> -</a:t>
-            </a:r>
-            <a:r>
-              <a:rPr lang="fr-FR" sz="1600" dirty="0" err="1"/>
-              <a:t>fR</a:t>
-            </a:r>
-            <a:r>
-              <a:rPr lang="fr-FR" sz="1600" dirty="0"/>
-              <a:t> out input</a:t>
-            </a:r>
-          </a:p>
-          <a:p>
-            <a:r>
-              <a:rPr lang="fr-FR" sz="1600" dirty="0"/>
-              <a:t>	@ln -s </a:t>
-            </a:r>
-            <a:r>
-              <a:rPr lang="fr-FR" sz="1600" dirty="0" err="1"/>
-              <a:t>miniinput</a:t>
-            </a:r>
-            <a:r>
-              <a:rPr lang="fr-FR" sz="1600" dirty="0"/>
-              <a:t> input</a:t>
-            </a:r>
-          </a:p>
-          <a:p>
-            <a:r>
-              <a:rPr lang="fr-FR" sz="1600" dirty="0"/>
-              <a:t>	</a:t>
-            </a:r>
-            <a:r>
-              <a:rPr lang="fr-FR" sz="1600" dirty="0" err="1"/>
-              <a:t>mpirun</a:t>
-            </a:r>
-            <a:r>
-              <a:rPr lang="fr-FR" sz="1600" dirty="0"/>
-              <a:t> -</a:t>
-            </a:r>
-            <a:r>
-              <a:rPr lang="fr-FR" sz="1600" dirty="0" err="1"/>
-              <a:t>np</a:t>
-            </a:r>
-            <a:r>
-              <a:rPr lang="fr-FR" sz="1600" dirty="0"/>
-              <a:t> 8 paris</a:t>
-            </a:r>
+            <a:endParaRPr lang="fr-FR" sz="1600" dirty="0"/>
           </a:p>
           <a:p>
             <a:endParaRPr lang="fr-FR" sz="1600" dirty="0"/>

</xml_diff>

<commit_message>
layer removal option in solids
</commit_message>
<xml_diff>
--- a/Documentation/ParisSimulator.pptx
+++ b/Documentation/ParisSimulator.pptx
@@ -300,7 +300,7 @@
           <a:p>
             <a:fld id="{3E385DA3-9999-6A48-ABB1-3CFD9335C687}" type="datetimeFigureOut">
               <a:rPr lang="fr-FR" smtClean="0"/>
-              <a:t>09/04/13</a:t>
+              <a:t>11/12/13</a:t>
             </a:fld>
             <a:endParaRPr lang="fr-FR"/>
           </a:p>
@@ -470,7 +470,7 @@
           <a:p>
             <a:fld id="{3E385DA3-9999-6A48-ABB1-3CFD9335C687}" type="datetimeFigureOut">
               <a:rPr lang="fr-FR" smtClean="0"/>
-              <a:t>09/04/13</a:t>
+              <a:t>11/12/13</a:t>
             </a:fld>
             <a:endParaRPr lang="fr-FR"/>
           </a:p>
@@ -650,7 +650,7 @@
           <a:p>
             <a:fld id="{3E385DA3-9999-6A48-ABB1-3CFD9335C687}" type="datetimeFigureOut">
               <a:rPr lang="fr-FR" smtClean="0"/>
-              <a:t>09/04/13</a:t>
+              <a:t>11/12/13</a:t>
             </a:fld>
             <a:endParaRPr lang="fr-FR"/>
           </a:p>
@@ -820,7 +820,7 @@
           <a:p>
             <a:fld id="{3E385DA3-9999-6A48-ABB1-3CFD9335C687}" type="datetimeFigureOut">
               <a:rPr lang="fr-FR" smtClean="0"/>
-              <a:t>09/04/13</a:t>
+              <a:t>11/12/13</a:t>
             </a:fld>
             <a:endParaRPr lang="fr-FR"/>
           </a:p>
@@ -1066,7 +1066,7 @@
           <a:p>
             <a:fld id="{3E385DA3-9999-6A48-ABB1-3CFD9335C687}" type="datetimeFigureOut">
               <a:rPr lang="fr-FR" smtClean="0"/>
-              <a:t>09/04/13</a:t>
+              <a:t>11/12/13</a:t>
             </a:fld>
             <a:endParaRPr lang="fr-FR"/>
           </a:p>
@@ -1354,7 +1354,7 @@
           <a:p>
             <a:fld id="{3E385DA3-9999-6A48-ABB1-3CFD9335C687}" type="datetimeFigureOut">
               <a:rPr lang="fr-FR" smtClean="0"/>
-              <a:t>09/04/13</a:t>
+              <a:t>11/12/13</a:t>
             </a:fld>
             <a:endParaRPr lang="fr-FR"/>
           </a:p>
@@ -1776,7 +1776,7 @@
           <a:p>
             <a:fld id="{3E385DA3-9999-6A48-ABB1-3CFD9335C687}" type="datetimeFigureOut">
               <a:rPr lang="fr-FR" smtClean="0"/>
-              <a:t>09/04/13</a:t>
+              <a:t>11/12/13</a:t>
             </a:fld>
             <a:endParaRPr lang="fr-FR"/>
           </a:p>
@@ -1894,7 +1894,7 @@
           <a:p>
             <a:fld id="{3E385DA3-9999-6A48-ABB1-3CFD9335C687}" type="datetimeFigureOut">
               <a:rPr lang="fr-FR" smtClean="0"/>
-              <a:t>09/04/13</a:t>
+              <a:t>11/12/13</a:t>
             </a:fld>
             <a:endParaRPr lang="fr-FR"/>
           </a:p>
@@ -1989,7 +1989,7 @@
           <a:p>
             <a:fld id="{3E385DA3-9999-6A48-ABB1-3CFD9335C687}" type="datetimeFigureOut">
               <a:rPr lang="fr-FR" smtClean="0"/>
-              <a:t>09/04/13</a:t>
+              <a:t>11/12/13</a:t>
             </a:fld>
             <a:endParaRPr lang="fr-FR"/>
           </a:p>
@@ -2266,7 +2266,7 @@
           <a:p>
             <a:fld id="{3E385DA3-9999-6A48-ABB1-3CFD9335C687}" type="datetimeFigureOut">
               <a:rPr lang="fr-FR" smtClean="0"/>
-              <a:t>09/04/13</a:t>
+              <a:t>11/12/13</a:t>
             </a:fld>
             <a:endParaRPr lang="fr-FR"/>
           </a:p>
@@ -2519,7 +2519,7 @@
           <a:p>
             <a:fld id="{3E385DA3-9999-6A48-ABB1-3CFD9335C687}" type="datetimeFigureOut">
               <a:rPr lang="fr-FR" smtClean="0"/>
-              <a:t>09/04/13</a:t>
+              <a:t>11/12/13</a:t>
             </a:fld>
             <a:endParaRPr lang="fr-FR"/>
           </a:p>
@@ -2732,7 +2732,7 @@
           <a:p>
             <a:fld id="{3E385DA3-9999-6A48-ABB1-3CFD9335C687}" type="datetimeFigureOut">
               <a:rPr lang="fr-FR" smtClean="0"/>
-              <a:t>09/04/13</a:t>
+              <a:t>11/12/13</a:t>
             </a:fld>
             <a:endParaRPr lang="fr-FR"/>
           </a:p>
@@ -3149,7 +3149,43 @@
           <a:bodyPr/>
           <a:lstStyle/>
           <a:p>
-            <a:endParaRPr lang="fr-FR"/>
+            <a:r>
+              <a:rPr lang="fr-FR" dirty="0" smtClean="0">
+                <a:solidFill>
+                  <a:schemeClr val="tx2">
+                    <a:lumMod val="75000"/>
+                  </a:schemeClr>
+                </a:solidFill>
+              </a:rPr>
+              <a:t>11 </a:t>
+            </a:r>
+            <a:r>
+              <a:rPr lang="fr-FR" dirty="0" err="1" smtClean="0">
+                <a:solidFill>
+                  <a:schemeClr val="tx2">
+                    <a:lumMod val="75000"/>
+                  </a:schemeClr>
+                </a:solidFill>
+              </a:rPr>
+              <a:t>december</a:t>
+            </a:r>
+            <a:r>
+              <a:rPr lang="fr-FR" dirty="0" smtClean="0">
+                <a:solidFill>
+                  <a:schemeClr val="tx2">
+                    <a:lumMod val="75000"/>
+                  </a:schemeClr>
+                </a:solidFill>
+              </a:rPr>
+              <a:t> 2013</a:t>
+            </a:r>
+            <a:endParaRPr lang="fr-FR" dirty="0">
+              <a:solidFill>
+                <a:schemeClr val="tx2">
+                  <a:lumMod val="75000"/>
+                </a:schemeClr>
+              </a:solidFill>
+            </a:endParaRPr>
           </a:p>
         </p:txBody>
       </p:sp>
@@ -3994,11 +4030,7 @@
           <a:p>
             <a:r>
               <a:rPr lang="fr-FR" dirty="0" smtClean="0"/>
-              <a:t>- Stéphane Zaleski, </a:t>
-            </a:r>
-            <a:r>
-              <a:rPr lang="fr-FR" dirty="0" smtClean="0"/>
-              <a:t>∂</a:t>
+              <a:t>- Stéphane Zaleski, ∂</a:t>
             </a:r>
             <a:r>
               <a:rPr lang="fr-FR" dirty="0"/>
@@ -4062,13 +4094,8 @@
             </a:r>
             <a:r>
               <a:rPr lang="fr-FR" dirty="0" smtClean="0"/>
-              <a:t>, NJ, </a:t>
-            </a:r>
-            <a:r>
-              <a:rPr lang="fr-FR" dirty="0" smtClean="0"/>
-              <a:t>USA</a:t>
-            </a:r>
-            <a:endParaRPr lang="fr-FR" dirty="0" smtClean="0"/>
+              <a:t>, NJ, USA</a:t>
+            </a:r>
           </a:p>
         </p:txBody>
       </p:sp>
@@ -4318,7 +4345,6 @@
               <a:rPr lang="fr-FR" dirty="0" smtClean="0"/>
               <a:t> </a:t>
             </a:r>
-            <a:endParaRPr lang="fr-FR" dirty="0" smtClean="0"/>
           </a:p>
           <a:p>
             <a:r>
@@ -4327,15 +4353,7 @@
             </a:r>
             <a:r>
               <a:rPr lang="fr-FR" dirty="0" smtClean="0"/>
-              <a:t> </a:t>
-            </a:r>
-            <a:r>
-              <a:rPr lang="fr-FR" dirty="0" smtClean="0"/>
-              <a:t>to a </a:t>
-            </a:r>
-            <a:r>
-              <a:rPr lang="fr-FR" dirty="0" smtClean="0"/>
-              <a:t>simple </a:t>
+              <a:t> to a simple </a:t>
             </a:r>
             <a:r>
               <a:rPr lang="fr-FR" dirty="0" err="1" smtClean="0"/>
@@ -4385,46 +4403,42 @@
             </a:r>
             <a:r>
               <a:rPr lang="fr-FR" dirty="0" smtClean="0"/>
+              <a:t> as a free code </a:t>
+            </a:r>
+            <a:r>
+              <a:rPr lang="fr-FR" dirty="0" err="1" smtClean="0"/>
+              <a:t>under</a:t>
+            </a:r>
+            <a:r>
+              <a:rPr lang="fr-FR" dirty="0" smtClean="0"/>
+              <a:t> GPL.  </a:t>
+            </a:r>
+          </a:p>
+          <a:p>
+            <a:endParaRPr lang="fr-FR" dirty="0" smtClean="0"/>
+          </a:p>
+          <a:p>
+            <a:r>
+              <a:rPr lang="fr-FR" dirty="0" smtClean="0"/>
+              <a:t>80% </a:t>
+            </a:r>
+            <a:r>
+              <a:rPr lang="fr-FR" dirty="0" err="1" smtClean="0"/>
+              <a:t>based</a:t>
+            </a:r>
+            <a:r>
+              <a:rPr lang="fr-FR" dirty="0" smtClean="0"/>
+              <a:t> on FTC3D2011, a code by Gretar Tryggvason and </a:t>
+            </a:r>
+            <a:r>
+              <a:rPr lang="fr-FR" dirty="0" err="1" smtClean="0"/>
+              <a:t>Sadegh</a:t>
+            </a:r>
+            <a:r>
+              <a:rPr lang="fr-FR" dirty="0" smtClean="0"/>
               <a:t> </a:t>
             </a:r>
             <a:r>
-              <a:rPr lang="fr-FR" dirty="0" smtClean="0"/>
-              <a:t>as a free code </a:t>
-            </a:r>
-            <a:r>
-              <a:rPr lang="fr-FR" dirty="0" err="1" smtClean="0"/>
-              <a:t>under</a:t>
-            </a:r>
-            <a:r>
-              <a:rPr lang="fr-FR" dirty="0" smtClean="0"/>
-              <a:t> GPL.  </a:t>
-            </a:r>
-          </a:p>
-          <a:p>
-            <a:endParaRPr lang="fr-FR" dirty="0" smtClean="0"/>
-          </a:p>
-          <a:p>
-            <a:r>
-              <a:rPr lang="fr-FR" dirty="0" smtClean="0"/>
-              <a:t>80% </a:t>
-            </a:r>
-            <a:r>
-              <a:rPr lang="fr-FR" dirty="0" err="1" smtClean="0"/>
-              <a:t>based</a:t>
-            </a:r>
-            <a:r>
-              <a:rPr lang="fr-FR" dirty="0" smtClean="0"/>
-              <a:t> on FTC3D2011, a code by Gretar Tryggvason and </a:t>
-            </a:r>
-            <a:r>
-              <a:rPr lang="fr-FR" dirty="0" err="1" smtClean="0"/>
-              <a:t>Sadegh</a:t>
-            </a:r>
-            <a:r>
-              <a:rPr lang="fr-FR" dirty="0" smtClean="0"/>
-              <a:t> </a:t>
-            </a:r>
-            <a:r>
               <a:rPr lang="fr-FR" dirty="0" err="1" smtClean="0"/>
               <a:t>Dabiri</a:t>
             </a:r>
@@ -4436,11 +4450,7 @@
           <a:p>
             <a:r>
               <a:rPr lang="fr-FR" dirty="0" smtClean="0"/>
-              <a:t>20% on Surfer, </a:t>
-            </a:r>
-            <a:r>
-              <a:rPr lang="fr-FR" dirty="0" smtClean="0"/>
-              <a:t>by </a:t>
+              <a:t>20% on Surfer, by </a:t>
             </a:r>
             <a:r>
               <a:rPr lang="fr-FR" dirty="0" err="1" smtClean="0"/>
@@ -4448,11 +4458,7 @@
             </a:r>
             <a:r>
               <a:rPr lang="fr-FR" dirty="0" smtClean="0"/>
-              <a:t> Zaleski, </a:t>
-            </a:r>
-            <a:r>
-              <a:rPr lang="fr-FR" dirty="0" smtClean="0"/>
-              <a:t>Ruben Scardovelli, </a:t>
+              <a:t> Zaleski, Ruben Scardovelli, </a:t>
             </a:r>
             <a:r>
               <a:rPr lang="fr-FR" dirty="0" err="1" smtClean="0"/>
@@ -4533,7 +4539,7 @@
         <p:spPr>
           <a:xfrm>
             <a:off x="595751" y="893755"/>
-            <a:ext cx="8277809" cy="5078314"/>
+            <a:ext cx="8277809" cy="4801315"/>
           </a:xfrm>
           <a:prstGeom prst="rect">
             <a:avLst/>
@@ -4787,28 +4793,17 @@
             </a:r>
             <a:r>
               <a:rPr lang="fr-FR" dirty="0" smtClean="0"/>
-              <a:t> by </a:t>
-            </a:r>
-            <a:r>
-              <a:rPr lang="fr-FR" dirty="0" smtClean="0"/>
-              <a:t>QUICK (</a:t>
-            </a:r>
-            <a:r>
-              <a:rPr lang="fr-FR" dirty="0" err="1" smtClean="0"/>
-              <a:t>next</a:t>
-            </a:r>
-            <a:r>
-              <a:rPr lang="fr-FR" dirty="0" smtClean="0"/>
               <a:t> </a:t>
             </a:r>
             <a:r>
-              <a:rPr lang="fr-FR" dirty="0" err="1" smtClean="0"/>
-              <a:t>slide</a:t>
-            </a:r>
-            <a:r>
-              <a:rPr lang="fr-FR" dirty="0" smtClean="0"/>
-              <a:t>) </a:t>
-            </a:r>
+              <a:rPr lang="fr-FR" smtClean="0"/>
+              <a:t>by </a:t>
+            </a:r>
+            <a:r>
+              <a:rPr lang="fr-FR" smtClean="0"/>
+              <a:t>QUICK</a:t>
+            </a:r>
+            <a:endParaRPr lang="fr-FR" dirty="0" smtClean="0"/>
           </a:p>
           <a:p>
             <a:endParaRPr lang="fr-FR" dirty="0"/>
@@ -4816,11 +4811,7 @@
           <a:p>
             <a:r>
               <a:rPr lang="fr-FR" dirty="0" smtClean="0"/>
-              <a:t>- </a:t>
-            </a:r>
-            <a:r>
-              <a:rPr lang="fr-FR" dirty="0" smtClean="0"/>
-              <a:t>explicit or </a:t>
+              <a:t>- explicit or </a:t>
             </a:r>
             <a:r>
               <a:rPr lang="fr-FR" dirty="0" err="1" smtClean="0"/>
@@ -4869,11 +4860,7 @@
             </a:r>
             <a:r>
               <a:rPr lang="fr-FR" dirty="0" smtClean="0"/>
-              <a:t> </a:t>
-            </a:r>
-            <a:r>
-              <a:rPr lang="fr-FR" dirty="0" smtClean="0"/>
-              <a:t>use the </a:t>
+              <a:t> use the </a:t>
             </a:r>
             <a:r>
               <a:rPr lang="fr-FR" dirty="0" err="1" smtClean="0"/>
@@ -4906,7 +4893,7 @@
             </a:r>
             <a:r>
               <a:rPr lang="fr-FR" dirty="0" err="1" smtClean="0"/>
-              <a:t>elementary</a:t>
+              <a:t>height</a:t>
             </a:r>
             <a:r>
               <a:rPr lang="fr-FR" dirty="0" smtClean="0"/>
@@ -4914,25 +4901,11 @@
             </a:r>
             <a:r>
               <a:rPr lang="fr-FR" dirty="0" err="1" smtClean="0"/>
-              <a:t>Continuous</a:t>
-            </a:r>
-            <a:r>
-              <a:rPr lang="fr-FR" dirty="0" smtClean="0"/>
-              <a:t> Surface Stress </a:t>
-            </a:r>
-            <a:r>
-              <a:rPr lang="fr-FR" dirty="0" err="1" smtClean="0"/>
-              <a:t>method</a:t>
-            </a:r>
-            <a:r>
-              <a:rPr lang="fr-FR" dirty="0" smtClean="0"/>
-              <a:t> as in Surfer (in the </a:t>
-            </a:r>
-          </a:p>
-          <a:p>
-            <a:r>
-              <a:rPr lang="fr-FR" dirty="0" smtClean="0"/>
-              <a:t>first version). </a:t>
+              <a:t>functions</a:t>
+            </a:r>
+            <a:r>
+              <a:rPr lang="fr-FR" dirty="0" smtClean="0"/>
+              <a:t>.</a:t>
             </a:r>
             <a:endParaRPr lang="fr-FR" dirty="0"/>
           </a:p>
@@ -5180,51 +5153,41 @@
             </a:r>
             <a:r>
               <a:rPr lang="fr-FR" dirty="0" smtClean="0"/>
-              <a:t> an </a:t>
-            </a:r>
-            <a:r>
-              <a:rPr lang="fr-FR" dirty="0" err="1" smtClean="0"/>
-              <a:t>adjustable</a:t>
-            </a:r>
-            <a:r>
-              <a:rPr lang="fr-FR" dirty="0" smtClean="0"/>
               <a:t> </a:t>
             </a:r>
             <a:r>
               <a:rPr lang="fr-FR" dirty="0" err="1" smtClean="0"/>
-              <a:t>number</a:t>
-            </a:r>
-            <a:r>
-              <a:rPr lang="fr-FR" dirty="0" smtClean="0"/>
-              <a:t> of </a:t>
-            </a:r>
-            <a:r>
-              <a:rPr lang="fr-FR" dirty="0" err="1" smtClean="0"/>
-              <a:t>ghost</a:t>
+              <a:t>two</a:t>
             </a:r>
             <a:r>
               <a:rPr lang="fr-FR" dirty="0" smtClean="0"/>
               <a:t> </a:t>
             </a:r>
             <a:r>
+              <a:rPr lang="fr-FR" dirty="0" smtClean="0"/>
+              <a:t>ghost </a:t>
+            </a:r>
+            <a:r>
               <a:rPr lang="fr-FR" dirty="0" err="1" smtClean="0"/>
               <a:t>layers</a:t>
             </a:r>
             <a:r>
               <a:rPr lang="fr-FR" dirty="0" smtClean="0"/>
-              <a:t> (</a:t>
-            </a:r>
-            <a:r>
-              <a:rPr lang="fr-FR" dirty="0" err="1" smtClean="0"/>
-              <a:t>two</a:t>
-            </a:r>
-            <a:r>
-              <a:rPr lang="fr-FR" dirty="0" smtClean="0"/>
-              <a:t> in the </a:t>
-            </a:r>
-            <a:r>
-              <a:rPr lang="fr-FR" dirty="0" err="1" smtClean="0"/>
-              <a:t>present</a:t>
+              <a:t>. </a:t>
+            </a:r>
+            <a:endParaRPr lang="fr-FR" dirty="0" smtClean="0"/>
+          </a:p>
+          <a:p>
+            <a:endParaRPr lang="fr-FR" dirty="0"/>
+          </a:p>
+          <a:p>
+            <a:r>
+              <a:rPr lang="fr-FR" dirty="0" smtClean="0"/>
+              <a:t>- </a:t>
+            </a:r>
+            <a:r>
+              <a:rPr lang="fr-FR" dirty="0" err="1" smtClean="0"/>
+              <a:t>Various</a:t>
             </a:r>
             <a:r>
               <a:rPr lang="fr-FR" dirty="0" smtClean="0"/>
@@ -5232,36 +5195,15 @@
             </a:r>
             <a:r>
               <a:rPr lang="fr-FR" dirty="0" err="1" smtClean="0"/>
-              <a:t>implementation</a:t>
-            </a:r>
-            <a:r>
-              <a:rPr lang="fr-FR" dirty="0" smtClean="0"/>
-              <a:t>). </a:t>
-            </a:r>
-          </a:p>
-          <a:p>
-            <a:endParaRPr lang="fr-FR" dirty="0"/>
-          </a:p>
-          <a:p>
-            <a:r>
-              <a:rPr lang="fr-FR" dirty="0" smtClean="0"/>
-              <a:t>- </a:t>
-            </a:r>
-            <a:r>
-              <a:rPr lang="fr-FR" dirty="0" err="1" smtClean="0"/>
-              <a:t>Two</a:t>
+              <a:t>boundary</a:t>
             </a:r>
             <a:r>
               <a:rPr lang="fr-FR" dirty="0" smtClean="0"/>
               <a:t> </a:t>
             </a:r>
             <a:r>
-              <a:rPr lang="fr-FR" dirty="0" err="1" smtClean="0"/>
-              <a:t>boundary</a:t>
-            </a:r>
-            <a:r>
-              <a:rPr lang="fr-FR" dirty="0" smtClean="0"/>
-              <a:t> types: </a:t>
+              <a:rPr lang="fr-FR" dirty="0" smtClean="0"/>
+              <a:t>types: </a:t>
             </a:r>
             <a:r>
               <a:rPr lang="fr-FR" dirty="0" err="1" smtClean="0"/>
@@ -5276,7 +5218,19 @@
               <a:t>wall</a:t>
             </a:r>
             <a:r>
-              <a:rPr lang="fr-FR" dirty="0"/>
+              <a:rPr lang="fr-FR" dirty="0" err="1" smtClean="0"/>
+              <a:t>,inflow</a:t>
+            </a:r>
+            <a:r>
+              <a:rPr lang="fr-FR" dirty="0" smtClean="0"/>
+              <a:t>, </a:t>
+            </a:r>
+            <a:r>
+              <a:rPr lang="fr-FR" dirty="0" err="1" smtClean="0"/>
+              <a:t>outflow</a:t>
+            </a:r>
+            <a:r>
+              <a:rPr lang="fr-FR" dirty="0" smtClean="0"/>
               <a:t> </a:t>
             </a:r>
             <a:r>
@@ -5353,11 +5307,15 @@
           <a:p>
             <a:r>
               <a:rPr lang="fr-FR" dirty="0" smtClean="0"/>
-              <a:t>-   No input format for for </a:t>
-            </a:r>
-            <a:r>
-              <a:rPr lang="fr-FR" dirty="0" err="1" smtClean="0"/>
-              <a:t>geometrical</a:t>
+              <a:t>-   </a:t>
+            </a:r>
+            <a:r>
+              <a:rPr lang="fr-FR" dirty="0" smtClean="0"/>
+              <a:t>Input of </a:t>
+            </a:r>
+            <a:r>
+              <a:rPr lang="fr-FR" dirty="0" err="1" smtClean="0"/>
+              <a:t>solid</a:t>
             </a:r>
             <a:r>
               <a:rPr lang="fr-FR" dirty="0" smtClean="0"/>
@@ -5369,21 +5327,22 @@
             </a:r>
             <a:r>
               <a:rPr lang="fr-FR" dirty="0" smtClean="0"/>
-              <a:t> </a:t>
-            </a:r>
-            <a:r>
-              <a:rPr lang="fr-FR" dirty="0" err="1" smtClean="0"/>
-              <a:t>so</a:t>
-            </a:r>
-            <a:r>
-              <a:rPr lang="fr-FR" dirty="0" smtClean="0"/>
-              <a:t> far. </a:t>
-            </a:r>
-          </a:p>
-          <a:p>
+              <a:t> by bitmap </a:t>
+            </a:r>
+            <a:r>
+              <a:rPr lang="fr-FR" dirty="0" err="1" smtClean="0"/>
+              <a:t>voxel</a:t>
+            </a:r>
+            <a:r>
+              <a:rPr lang="fr-FR" dirty="0" smtClean="0"/>
+              <a:t> data. </a:t>
+            </a:r>
             <a:endParaRPr lang="fr-FR" dirty="0" smtClean="0"/>
           </a:p>
           <a:p>
+            <a:endParaRPr lang="fr-FR" dirty="0" smtClean="0"/>
+          </a:p>
+          <a:p>
             <a:r>
               <a:rPr lang="fr-FR" dirty="0" smtClean="0"/>
               <a:t>-   Output format: </a:t>
@@ -5402,11 +5361,7 @@
             </a:r>
             <a:r>
               <a:rPr lang="fr-FR" dirty="0" smtClean="0"/>
-              <a:t> </a:t>
-            </a:r>
-            <a:r>
-              <a:rPr lang="fr-FR" dirty="0" smtClean="0"/>
-              <a:t>or </a:t>
+              <a:t> or </a:t>
             </a:r>
             <a:r>
               <a:rPr lang="fr-FR" dirty="0" err="1" smtClean="0"/>
@@ -5530,11 +5485,7 @@
           <a:p>
             <a:r>
               <a:rPr lang="fr-FR" dirty="0" smtClean="0"/>
-              <a:t>- </a:t>
-            </a:r>
-            <a:r>
-              <a:rPr lang="fr-FR" dirty="0" smtClean="0"/>
-              <a:t>Code </a:t>
+              <a:t>- Code </a:t>
             </a:r>
             <a:r>
               <a:rPr lang="fr-FR" dirty="0" err="1" smtClean="0"/>
@@ -5542,39 +5493,112 @@
             </a:r>
             <a:r>
               <a:rPr lang="fr-FR" dirty="0" smtClean="0"/>
+              <a:t> in Fortran90 </a:t>
+            </a:r>
+            <a:r>
+              <a:rPr lang="fr-FR" dirty="0" err="1" smtClean="0"/>
+              <a:t>except</a:t>
+            </a:r>
+            <a:r>
+              <a:rPr lang="fr-FR" dirty="0" smtClean="0"/>
+              <a:t> for </a:t>
+            </a:r>
+            <a:r>
+              <a:rPr lang="fr-FR" dirty="0" err="1" smtClean="0"/>
+              <a:t>some</a:t>
+            </a:r>
+            <a:r>
+              <a:rPr lang="fr-FR" dirty="0" smtClean="0"/>
+              <a:t> test scripts </a:t>
+            </a:r>
+            <a:r>
+              <a:rPr lang="fr-FR" dirty="0" err="1" smtClean="0"/>
+              <a:t>outside</a:t>
+            </a:r>
+            <a:r>
+              <a:rPr lang="fr-FR" dirty="0" smtClean="0"/>
+              <a:t> of the main code.</a:t>
+            </a:r>
+          </a:p>
+          <a:p>
+            <a:endParaRPr lang="fr-FR" dirty="0"/>
+          </a:p>
+          <a:p>
+            <a:r>
+              <a:rPr lang="fr-FR" dirty="0" smtClean="0"/>
+              <a:t>- All of FTC3D2011 (base version </a:t>
+            </a:r>
+            <a:r>
+              <a:rPr lang="fr-FR" dirty="0" err="1" smtClean="0"/>
+              <a:t>without</a:t>
+            </a:r>
+            <a:r>
+              <a:rPr lang="fr-FR" dirty="0" smtClean="0"/>
+              <a:t> front </a:t>
+            </a:r>
+            <a:r>
+              <a:rPr lang="fr-FR" dirty="0" err="1" smtClean="0"/>
+              <a:t>tracking</a:t>
+            </a:r>
+            <a:r>
+              <a:rPr lang="fr-FR" dirty="0" smtClean="0"/>
+              <a:t>) </a:t>
+            </a:r>
+            <a:r>
+              <a:rPr lang="fr-FR" dirty="0" err="1" smtClean="0"/>
+              <a:t>is</a:t>
+            </a:r>
+            <a:r>
+              <a:rPr lang="fr-FR" dirty="0" smtClean="0"/>
               <a:t> </a:t>
             </a:r>
             <a:r>
-              <a:rPr lang="fr-FR" dirty="0" smtClean="0"/>
-              <a:t>in </a:t>
-            </a:r>
-            <a:r>
-              <a:rPr lang="fr-FR" dirty="0" smtClean="0"/>
-              <a:t>Fortran90 </a:t>
-            </a:r>
-            <a:r>
-              <a:rPr lang="fr-FR" dirty="0" err="1" smtClean="0"/>
-              <a:t>except</a:t>
-            </a:r>
-            <a:r>
-              <a:rPr lang="fr-FR" dirty="0" smtClean="0"/>
-              <a:t> for </a:t>
-            </a:r>
-            <a:r>
-              <a:rPr lang="fr-FR" dirty="0" err="1" smtClean="0"/>
-              <a:t>some</a:t>
-            </a:r>
-            <a:r>
-              <a:rPr lang="fr-FR" dirty="0" smtClean="0"/>
-              <a:t> test scripts </a:t>
-            </a:r>
-            <a:r>
-              <a:rPr lang="fr-FR" dirty="0" err="1" smtClean="0"/>
-              <a:t>outside</a:t>
-            </a:r>
-            <a:r>
-              <a:rPr lang="fr-FR" dirty="0" smtClean="0"/>
-              <a:t> of the main code.</a:t>
+              <a:rPr lang="fr-FR" dirty="0" err="1" smtClean="0"/>
+              <a:t>contained</a:t>
+            </a:r>
+            <a:r>
+              <a:rPr lang="fr-FR" dirty="0" smtClean="0"/>
+              <a:t> in </a:t>
+            </a:r>
+            <a:r>
+              <a:rPr lang="fr-FR" dirty="0" err="1" smtClean="0"/>
+              <a:t>two</a:t>
+            </a:r>
+            <a:r>
+              <a:rPr lang="fr-FR" dirty="0" smtClean="0"/>
+              <a:t> f90 files ! </a:t>
+            </a:r>
+            <a:r>
+              <a:rPr lang="fr-FR" dirty="0" err="1" smtClean="0"/>
+              <a:t>Choice</a:t>
+            </a:r>
+            <a:r>
+              <a:rPr lang="fr-FR" dirty="0" smtClean="0"/>
+              <a:t> made to </a:t>
+            </a:r>
+            <a:r>
+              <a:rPr lang="fr-FR" dirty="0" err="1" smtClean="0"/>
+              <a:t>keep</a:t>
+            </a:r>
+            <a:r>
+              <a:rPr lang="fr-FR" dirty="0" smtClean="0"/>
+              <a:t> the </a:t>
+            </a:r>
+            <a:r>
+              <a:rPr lang="fr-FR" dirty="0" err="1" smtClean="0"/>
+              <a:t>number</a:t>
+            </a:r>
+            <a:r>
+              <a:rPr lang="fr-FR" dirty="0" smtClean="0"/>
+              <a:t> of files </a:t>
+            </a:r>
+            <a:r>
+              <a:rPr lang="fr-FR" dirty="0" err="1" smtClean="0"/>
+              <a:t>low</a:t>
+            </a:r>
+            <a:r>
+              <a:rPr lang="fr-FR" dirty="0" smtClean="0"/>
+              <a:t>. </a:t>
             </a:r>
           </a:p>
           <a:p>
@@ -5583,27 +5607,27 @@
           <a:p>
             <a:r>
               <a:rPr lang="fr-FR" dirty="0" smtClean="0"/>
-              <a:t>- All of FTC3D2011 (base version </a:t>
-            </a:r>
-            <a:r>
-              <a:rPr lang="fr-FR" dirty="0" err="1" smtClean="0"/>
-              <a:t>without</a:t>
-            </a:r>
-            <a:r>
-              <a:rPr lang="fr-FR" dirty="0" smtClean="0"/>
-              <a:t> front </a:t>
-            </a:r>
-            <a:r>
-              <a:rPr lang="fr-FR" dirty="0" err="1" smtClean="0"/>
-              <a:t>tracking</a:t>
-            </a:r>
-            <a:r>
-              <a:rPr lang="fr-FR" dirty="0" smtClean="0"/>
-              <a:t>) </a:t>
-            </a:r>
-            <a:r>
-              <a:rPr lang="fr-FR" dirty="0" err="1" smtClean="0"/>
-              <a:t>is</a:t>
+              <a:t>- no configure, </a:t>
+            </a:r>
+            <a:r>
+              <a:rPr lang="fr-FR" dirty="0" err="1" smtClean="0"/>
+              <a:t>only</a:t>
+            </a:r>
+            <a:r>
+              <a:rPr lang="fr-FR" dirty="0" smtClean="0"/>
+              <a:t> a short </a:t>
+            </a:r>
+            <a:r>
+              <a:rPr lang="fr-FR" dirty="0" err="1" smtClean="0"/>
+              <a:t>Makefile</a:t>
+            </a:r>
+            <a:r>
+              <a:rPr lang="fr-FR" dirty="0" smtClean="0"/>
+              <a:t>. But C </a:t>
+            </a:r>
+            <a:r>
+              <a:rPr lang="fr-FR" dirty="0" err="1" smtClean="0"/>
+              <a:t>users</a:t>
             </a:r>
             <a:r>
               <a:rPr lang="fr-FR" dirty="0" smtClean="0"/>
@@ -5611,108 +5635,11 @@
             </a:r>
             <a:r>
               <a:rPr lang="fr-FR" dirty="0" err="1" smtClean="0"/>
-              <a:t>contained</a:t>
-            </a:r>
-            <a:r>
-              <a:rPr lang="fr-FR" dirty="0" smtClean="0"/>
-              <a:t> in </a:t>
-            </a:r>
-            <a:r>
-              <a:rPr lang="fr-FR" dirty="0" err="1" smtClean="0"/>
-              <a:t>two</a:t>
-            </a:r>
-            <a:r>
-              <a:rPr lang="fr-FR" dirty="0" smtClean="0"/>
-              <a:t> f90 files </a:t>
-            </a:r>
-            <a:r>
-              <a:rPr lang="fr-FR" dirty="0" smtClean="0"/>
-              <a:t>! </a:t>
-            </a:r>
-            <a:r>
-              <a:rPr lang="fr-FR" dirty="0" err="1" smtClean="0"/>
-              <a:t>Choice</a:t>
-            </a:r>
-            <a:r>
-              <a:rPr lang="fr-FR" dirty="0" smtClean="0"/>
-              <a:t> </a:t>
-            </a:r>
-            <a:r>
-              <a:rPr lang="fr-FR" dirty="0" smtClean="0"/>
-              <a:t>made to </a:t>
-            </a:r>
-            <a:r>
-              <a:rPr lang="fr-FR" dirty="0" err="1" smtClean="0"/>
-              <a:t>keep</a:t>
-            </a:r>
-            <a:r>
-              <a:rPr lang="fr-FR" dirty="0" smtClean="0"/>
-              <a:t> the </a:t>
-            </a:r>
-            <a:r>
-              <a:rPr lang="fr-FR" dirty="0" err="1" smtClean="0"/>
-              <a:t>number</a:t>
-            </a:r>
-            <a:r>
-              <a:rPr lang="fr-FR" dirty="0" smtClean="0"/>
-              <a:t> of files </a:t>
-            </a:r>
-            <a:r>
-              <a:rPr lang="fr-FR" dirty="0" err="1" smtClean="0"/>
-              <a:t>low</a:t>
-            </a:r>
-            <a:r>
-              <a:rPr lang="fr-FR" dirty="0" smtClean="0"/>
-              <a:t>. </a:t>
-            </a:r>
-          </a:p>
-          <a:p>
-            <a:endParaRPr lang="fr-FR" dirty="0"/>
-          </a:p>
-          <a:p>
-            <a:r>
-              <a:rPr lang="fr-FR" dirty="0" smtClean="0"/>
-              <a:t>- no configure, </a:t>
-            </a:r>
-            <a:r>
-              <a:rPr lang="fr-FR" dirty="0" err="1" smtClean="0"/>
-              <a:t>only</a:t>
-            </a:r>
-            <a:r>
-              <a:rPr lang="fr-FR" dirty="0" smtClean="0"/>
-              <a:t> a short </a:t>
-            </a:r>
-            <a:r>
-              <a:rPr lang="fr-FR" dirty="0" err="1" smtClean="0"/>
-              <a:t>Makefile</a:t>
-            </a:r>
-            <a:r>
-              <a:rPr lang="fr-FR" dirty="0" smtClean="0"/>
-              <a:t>. </a:t>
-            </a:r>
-            <a:r>
-              <a:rPr lang="fr-FR" dirty="0" smtClean="0"/>
-              <a:t>But C </a:t>
-            </a:r>
-            <a:r>
-              <a:rPr lang="fr-FR" dirty="0" err="1" smtClean="0"/>
-              <a:t>users</a:t>
-            </a:r>
-            <a:r>
-              <a:rPr lang="fr-FR" dirty="0" smtClean="0"/>
-              <a:t> </a:t>
-            </a:r>
-            <a:r>
-              <a:rPr lang="fr-FR" dirty="0" err="1" smtClean="0"/>
               <a:t>beware</a:t>
             </a:r>
             <a:r>
               <a:rPr lang="fr-FR" dirty="0" smtClean="0"/>
-              <a:t>, </a:t>
-            </a:r>
-            <a:r>
-              <a:rPr lang="fr-FR" dirty="0" smtClean="0"/>
-              <a:t>f90 compilation </a:t>
+              <a:t>, f90 compilation </a:t>
             </a:r>
             <a:r>
               <a:rPr lang="fr-FR" dirty="0" err="1" smtClean="0"/>

</xml_diff>

<commit_message>
pariserror only outputs on rank 0
</commit_message>
<xml_diff>
--- a/Documentation/ParisSimulator.pptx
+++ b/Documentation/ParisSimulator.pptx
@@ -18,6 +18,7 @@
     <p:sldId id="267" r:id="rId12"/>
     <p:sldId id="268" r:id="rId13"/>
     <p:sldId id="269" r:id="rId14"/>
+    <p:sldId id="270" r:id="rId15"/>
   </p:sldIdLst>
   <p:sldSz cx="9144000" cy="6858000" type="screen4x3"/>
   <p:notesSz cx="6858000" cy="9144000"/>
@@ -300,7 +301,7 @@
           <a:p>
             <a:fld id="{3E385DA3-9999-6A48-ABB1-3CFD9335C687}" type="datetimeFigureOut">
               <a:rPr lang="fr-FR" smtClean="0"/>
-              <a:t>11/12/13</a:t>
+              <a:t>14/01/2014</a:t>
             </a:fld>
             <a:endParaRPr lang="fr-FR"/>
           </a:p>
@@ -470,7 +471,7 @@
           <a:p>
             <a:fld id="{3E385DA3-9999-6A48-ABB1-3CFD9335C687}" type="datetimeFigureOut">
               <a:rPr lang="fr-FR" smtClean="0"/>
-              <a:t>11/12/13</a:t>
+              <a:t>14/01/2014</a:t>
             </a:fld>
             <a:endParaRPr lang="fr-FR"/>
           </a:p>
@@ -650,7 +651,7 @@
           <a:p>
             <a:fld id="{3E385DA3-9999-6A48-ABB1-3CFD9335C687}" type="datetimeFigureOut">
               <a:rPr lang="fr-FR" smtClean="0"/>
-              <a:t>11/12/13</a:t>
+              <a:t>14/01/2014</a:t>
             </a:fld>
             <a:endParaRPr lang="fr-FR"/>
           </a:p>
@@ -820,7 +821,7 @@
           <a:p>
             <a:fld id="{3E385DA3-9999-6A48-ABB1-3CFD9335C687}" type="datetimeFigureOut">
               <a:rPr lang="fr-FR" smtClean="0"/>
-              <a:t>11/12/13</a:t>
+              <a:t>14/01/2014</a:t>
             </a:fld>
             <a:endParaRPr lang="fr-FR"/>
           </a:p>
@@ -1066,7 +1067,7 @@
           <a:p>
             <a:fld id="{3E385DA3-9999-6A48-ABB1-3CFD9335C687}" type="datetimeFigureOut">
               <a:rPr lang="fr-FR" smtClean="0"/>
-              <a:t>11/12/13</a:t>
+              <a:t>14/01/2014</a:t>
             </a:fld>
             <a:endParaRPr lang="fr-FR"/>
           </a:p>
@@ -1354,7 +1355,7 @@
           <a:p>
             <a:fld id="{3E385DA3-9999-6A48-ABB1-3CFD9335C687}" type="datetimeFigureOut">
               <a:rPr lang="fr-FR" smtClean="0"/>
-              <a:t>11/12/13</a:t>
+              <a:t>14/01/2014</a:t>
             </a:fld>
             <a:endParaRPr lang="fr-FR"/>
           </a:p>
@@ -1776,7 +1777,7 @@
           <a:p>
             <a:fld id="{3E385DA3-9999-6A48-ABB1-3CFD9335C687}" type="datetimeFigureOut">
               <a:rPr lang="fr-FR" smtClean="0"/>
-              <a:t>11/12/13</a:t>
+              <a:t>14/01/2014</a:t>
             </a:fld>
             <a:endParaRPr lang="fr-FR"/>
           </a:p>
@@ -1894,7 +1895,7 @@
           <a:p>
             <a:fld id="{3E385DA3-9999-6A48-ABB1-3CFD9335C687}" type="datetimeFigureOut">
               <a:rPr lang="fr-FR" smtClean="0"/>
-              <a:t>11/12/13</a:t>
+              <a:t>14/01/2014</a:t>
             </a:fld>
             <a:endParaRPr lang="fr-FR"/>
           </a:p>
@@ -1989,7 +1990,7 @@
           <a:p>
             <a:fld id="{3E385DA3-9999-6A48-ABB1-3CFD9335C687}" type="datetimeFigureOut">
               <a:rPr lang="fr-FR" smtClean="0"/>
-              <a:t>11/12/13</a:t>
+              <a:t>14/01/2014</a:t>
             </a:fld>
             <a:endParaRPr lang="fr-FR"/>
           </a:p>
@@ -2266,7 +2267,7 @@
           <a:p>
             <a:fld id="{3E385DA3-9999-6A48-ABB1-3CFD9335C687}" type="datetimeFigureOut">
               <a:rPr lang="fr-FR" smtClean="0"/>
-              <a:t>11/12/13</a:t>
+              <a:t>14/01/2014</a:t>
             </a:fld>
             <a:endParaRPr lang="fr-FR"/>
           </a:p>
@@ -2519,7 +2520,7 @@
           <a:p>
             <a:fld id="{3E385DA3-9999-6A48-ABB1-3CFD9335C687}" type="datetimeFigureOut">
               <a:rPr lang="fr-FR" smtClean="0"/>
-              <a:t>11/12/13</a:t>
+              <a:t>14/01/2014</a:t>
             </a:fld>
             <a:endParaRPr lang="fr-FR"/>
           </a:p>
@@ -2732,7 +2733,7 @@
           <a:p>
             <a:fld id="{3E385DA3-9999-6A48-ABB1-3CFD9335C687}" type="datetimeFigureOut">
               <a:rPr lang="fr-FR" smtClean="0"/>
-              <a:t>11/12/13</a:t>
+              <a:t>14/01/2014</a:t>
             </a:fld>
             <a:endParaRPr lang="fr-FR"/>
           </a:p>
@@ -3167,7 +3168,7 @@
                   </a:schemeClr>
                 </a:solidFill>
               </a:rPr>
-              <a:t>december</a:t>
+              <a:t>january</a:t>
             </a:r>
             <a:r>
               <a:rPr lang="fr-FR" dirty="0" smtClean="0">
@@ -3177,7 +3178,7 @@
                   </a:schemeClr>
                 </a:solidFill>
               </a:rPr>
-              <a:t> 2013</a:t>
+              <a:t> 2014</a:t>
             </a:r>
             <a:endParaRPr lang="fr-FR" dirty="0">
               <a:solidFill>
@@ -3933,6 +3934,73 @@
 </p:sld>
 </file>
 
+<file path=ppt/slides/slide14.xml><?xml version="1.0" encoding="utf-8"?>
+<p:sld xmlns:a="http://schemas.openxmlformats.org/drawingml/2006/main" xmlns:r="http://schemas.openxmlformats.org/officeDocument/2006/relationships" xmlns:p="http://schemas.openxmlformats.org/presentationml/2006/main">
+  <p:cSld>
+    <p:spTree>
+      <p:nvGrpSpPr>
+        <p:cNvPr id="1" name=""/>
+        <p:cNvGrpSpPr/>
+        <p:nvPr/>
+      </p:nvGrpSpPr>
+      <p:grpSpPr>
+        <a:xfrm>
+          <a:off x="0" y="0"/>
+          <a:ext cx="0" cy="0"/>
+          <a:chOff x="0" y="0"/>
+          <a:chExt cx="0" cy="0"/>
+        </a:xfrm>
+      </p:grpSpPr>
+      <p:pic>
+        <p:nvPicPr>
+          <p:cNvPr id="8" name="Image 7" descr="ccnuma.pdf"/>
+          <p:cNvPicPr>
+            <a:picLocks noChangeAspect="1"/>
+          </p:cNvPicPr>
+          <p:nvPr/>
+        </p:nvPicPr>
+        <p:blipFill>
+          <a:blip r:embed="rId2">
+            <a:extLst>
+              <a:ext uri="{28A0092B-C50C-407E-A947-70E740481C1C}">
+                <a14:useLocalDpi xmlns:a14="http://schemas.microsoft.com/office/drawing/2010/main" val="0"/>
+              </a:ext>
+            </a:extLst>
+          </a:blip>
+          <a:stretch>
+            <a:fillRect/>
+          </a:stretch>
+        </p:blipFill>
+        <p:spPr>
+          <a:xfrm>
+            <a:off x="-583362" y="335783"/>
+            <a:ext cx="10122150" cy="6073290"/>
+          </a:xfrm>
+          <a:prstGeom prst="rect">
+            <a:avLst/>
+          </a:prstGeom>
+        </p:spPr>
+      </p:pic>
+    </p:spTree>
+    <p:extLst>
+      <p:ext uri="{BB962C8B-B14F-4D97-AF65-F5344CB8AC3E}">
+        <p14:creationId xmlns:p14="http://schemas.microsoft.com/office/powerpoint/2010/main" val="3360998968"/>
+      </p:ext>
+    </p:extLst>
+  </p:cSld>
+  <p:clrMapOvr>
+    <a:masterClrMapping/>
+  </p:clrMapOvr>
+  <p:timing>
+    <p:tnLst>
+      <p:par>
+        <p:cTn xmlns:p14="http://schemas.microsoft.com/office/powerpoint/2010/main" id="1" dur="indefinite" restart="never" nodeType="tmRoot"/>
+      </p:par>
+    </p:tnLst>
+  </p:timing>
+</p:sld>
+</file>
+
 <file path=ppt/slides/slide2.xml><?xml version="1.0" encoding="utf-8"?>
 <p:sld xmlns:a="http://schemas.openxmlformats.org/drawingml/2006/main" xmlns:r="http://schemas.openxmlformats.org/officeDocument/2006/relationships" xmlns:p="http://schemas.openxmlformats.org/presentationml/2006/main">
   <p:cSld>
@@ -4370,7 +4438,7 @@
           <a:p>
             <a:r>
               <a:rPr lang="fr-FR" dirty="0" smtClean="0"/>
-              <a:t>3) To serve as a backup to Gerris in case </a:t>
+              <a:t>3) To serve as a backup in case </a:t>
             </a:r>
             <a:r>
               <a:rPr lang="fr-FR" dirty="0" err="1" smtClean="0"/>
@@ -4386,7 +4454,23 @@
             </a:r>
             <a:r>
               <a:rPr lang="fr-FR" dirty="0" smtClean="0"/>
-              <a:t> in certain applications. </a:t>
+              <a:t> in certain applications</a:t>
+            </a:r>
+            <a:r>
+              <a:rPr lang="fr-FR" dirty="0"/>
+              <a:t> </a:t>
+            </a:r>
+            <a:r>
+              <a:rPr lang="fr-FR" dirty="0" smtClean="0"/>
+              <a:t>for the </a:t>
+            </a:r>
+            <a:r>
+              <a:rPr lang="fr-FR" dirty="0" err="1" smtClean="0"/>
+              <a:t>other</a:t>
+            </a:r>
+            <a:r>
+              <a:rPr lang="fr-FR" dirty="0" smtClean="0"/>
+              <a:t> codes of the group. </a:t>
             </a:r>
           </a:p>
           <a:p>
@@ -4419,8 +4503,12 @@
           </a:p>
           <a:p>
             <a:r>
-              <a:rPr lang="fr-FR" dirty="0" smtClean="0"/>
-              <a:t>80% </a:t>
+              <a:rPr lang="fr-FR" dirty="0"/>
+              <a:t>7</a:t>
+            </a:r>
+            <a:r>
+              <a:rPr lang="fr-FR" dirty="0" smtClean="0"/>
+              <a:t>0% </a:t>
             </a:r>
             <a:r>
               <a:rPr lang="fr-FR" dirty="0" err="1" smtClean="0"/>
@@ -4699,7 +4787,15 @@
           <a:p>
             <a:r>
               <a:rPr lang="fr-FR" dirty="0" smtClean="0"/>
-              <a:t>- MAC </a:t>
+              <a:t>- MAC (</a:t>
+            </a:r>
+            <a:r>
+              <a:rPr lang="fr-FR" dirty="0" err="1" smtClean="0"/>
+              <a:t>stagggered</a:t>
+            </a:r>
+            <a:r>
+              <a:rPr lang="fr-FR" dirty="0" smtClean="0"/>
+              <a:t>) </a:t>
             </a:r>
             <a:r>
               <a:rPr lang="fr-FR" dirty="0" err="1" smtClean="0"/>
@@ -4793,17 +4889,41 @@
             </a:r>
             <a:r>
               <a:rPr lang="fr-FR" dirty="0" smtClean="0"/>
+              <a:t> by QUICK</a:t>
+            </a:r>
+          </a:p>
+          <a:p>
+            <a:endParaRPr lang="fr-FR" dirty="0"/>
+          </a:p>
+          <a:p>
+            <a:r>
+              <a:rPr lang="fr-FR" dirty="0" smtClean="0"/>
+              <a:t>- explicit or </a:t>
+            </a:r>
+            <a:r>
+              <a:rPr lang="fr-FR" dirty="0" err="1" smtClean="0"/>
+              <a:t>implicit</a:t>
+            </a:r>
+            <a:r>
+              <a:rPr lang="fr-FR" dirty="0" smtClean="0"/>
               <a:t> </a:t>
             </a:r>
             <a:r>
-              <a:rPr lang="fr-FR" smtClean="0"/>
-              <a:t>by </a:t>
-            </a:r>
-            <a:r>
-              <a:rPr lang="fr-FR" smtClean="0"/>
-              <a:t>QUICK</a:t>
-            </a:r>
-            <a:endParaRPr lang="fr-FR" dirty="0" smtClean="0"/>
+              <a:rPr lang="fr-FR" dirty="0" err="1" smtClean="0"/>
+              <a:t>viscous</a:t>
+            </a:r>
+            <a:r>
+              <a:rPr lang="fr-FR" dirty="0" smtClean="0"/>
+              <a:t> </a:t>
+            </a:r>
+            <a:r>
+              <a:rPr lang="fr-FR" dirty="0" err="1" smtClean="0"/>
+              <a:t>terms</a:t>
+            </a:r>
+            <a:r>
+              <a:rPr lang="fr-FR" dirty="0" smtClean="0"/>
+              <a:t>. </a:t>
+            </a:r>
           </a:p>
           <a:p>
             <a:endParaRPr lang="fr-FR" dirty="0"/>
@@ -4811,11 +4931,11 @@
           <a:p>
             <a:r>
               <a:rPr lang="fr-FR" dirty="0" smtClean="0"/>
-              <a:t>- explicit or </a:t>
-            </a:r>
-            <a:r>
-              <a:rPr lang="fr-FR" dirty="0" err="1" smtClean="0"/>
-              <a:t>implicit</a:t>
+              <a:t>- VOF – PLIC for interface reconstruction and advection </a:t>
+            </a:r>
+            <a:r>
+              <a:rPr lang="fr-FR" dirty="0" err="1" smtClean="0"/>
+              <a:t>either</a:t>
             </a:r>
             <a:r>
               <a:rPr lang="fr-FR" dirty="0" smtClean="0"/>
@@ -4823,64 +4943,19 @@
             </a:r>
             <a:r>
               <a:rPr lang="fr-FR" dirty="0" err="1" smtClean="0"/>
-              <a:t>viscous</a:t>
-            </a:r>
-            <a:r>
-              <a:rPr lang="fr-FR" dirty="0" smtClean="0"/>
-              <a:t> </a:t>
-            </a:r>
-            <a:r>
-              <a:rPr lang="fr-FR" dirty="0" err="1" smtClean="0"/>
-              <a:t>terms</a:t>
+              <a:t>with</a:t>
+            </a:r>
+            <a:r>
+              <a:rPr lang="fr-FR" dirty="0" smtClean="0"/>
+              <a:t> CIAM or the conservative VOF of Yue &amp; </a:t>
+            </a:r>
+            <a:r>
+              <a:rPr lang="fr-FR" dirty="0" err="1" smtClean="0"/>
+              <a:t>Weymouth</a:t>
             </a:r>
             <a:r>
               <a:rPr lang="fr-FR" dirty="0" smtClean="0"/>
               <a:t>. </a:t>
-            </a:r>
-          </a:p>
-          <a:p>
-            <a:endParaRPr lang="fr-FR" dirty="0"/>
-          </a:p>
-          <a:p>
-            <a:r>
-              <a:rPr lang="fr-FR" dirty="0" smtClean="0"/>
-              <a:t>- VOF - PLIC – CIAM for interface reconstruction and advection (in the first version </a:t>
-            </a:r>
-            <a:r>
-              <a:rPr lang="fr-FR" dirty="0" err="1" smtClean="0"/>
-              <a:t>we</a:t>
-            </a:r>
-            <a:r>
-              <a:rPr lang="fr-FR" dirty="0" smtClean="0"/>
-              <a:t> </a:t>
-            </a:r>
-            <a:r>
-              <a:rPr lang="fr-FR" dirty="0" err="1" smtClean="0"/>
-              <a:t>just</a:t>
-            </a:r>
-            <a:r>
-              <a:rPr lang="fr-FR" dirty="0" smtClean="0"/>
-              <a:t> use the </a:t>
-            </a:r>
-            <a:r>
-              <a:rPr lang="fr-FR" dirty="0" err="1" smtClean="0"/>
-              <a:t>relatively</a:t>
-            </a:r>
-            <a:r>
-              <a:rPr lang="fr-FR" dirty="0" smtClean="0"/>
-              <a:t> simple VOF </a:t>
-            </a:r>
-            <a:r>
-              <a:rPr lang="fr-FR" dirty="0" err="1" smtClean="0"/>
-              <a:t>methods</a:t>
-            </a:r>
-            <a:r>
-              <a:rPr lang="fr-FR" dirty="0"/>
-              <a:t> </a:t>
-            </a:r>
-            <a:r>
-              <a:rPr lang="fr-FR" dirty="0" smtClean="0"/>
-              <a:t>in Surfer)</a:t>
             </a:r>
           </a:p>
           <a:p>
@@ -5161,33 +5236,44 @@
             </a:r>
             <a:r>
               <a:rPr lang="fr-FR" dirty="0" smtClean="0"/>
+              <a:t> ghost </a:t>
+            </a:r>
+            <a:r>
+              <a:rPr lang="fr-FR" dirty="0" err="1" smtClean="0"/>
+              <a:t>layers</a:t>
+            </a:r>
+            <a:r>
+              <a:rPr lang="fr-FR" dirty="0" smtClean="0"/>
+              <a:t>. </a:t>
+            </a:r>
+          </a:p>
+          <a:p>
+            <a:endParaRPr lang="fr-FR" dirty="0"/>
+          </a:p>
+          <a:p>
+            <a:r>
+              <a:rPr lang="fr-FR" dirty="0" smtClean="0"/>
+              <a:t>- </a:t>
+            </a:r>
+            <a:r>
+              <a:rPr lang="fr-FR" dirty="0" err="1" smtClean="0"/>
+              <a:t>Various</a:t>
+            </a:r>
+            <a:r>
+              <a:rPr lang="fr-FR" dirty="0" smtClean="0"/>
               <a:t> </a:t>
             </a:r>
             <a:r>
-              <a:rPr lang="fr-FR" dirty="0" smtClean="0"/>
-              <a:t>ghost </a:t>
-            </a:r>
-            <a:r>
-              <a:rPr lang="fr-FR" dirty="0" err="1" smtClean="0"/>
-              <a:t>layers</a:t>
-            </a:r>
-            <a:r>
-              <a:rPr lang="fr-FR" dirty="0" smtClean="0"/>
-              <a:t>. </a:t>
-            </a:r>
-            <a:endParaRPr lang="fr-FR" dirty="0" smtClean="0"/>
-          </a:p>
-          <a:p>
-            <a:endParaRPr lang="fr-FR" dirty="0"/>
-          </a:p>
-          <a:p>
-            <a:r>
-              <a:rPr lang="fr-FR" dirty="0" smtClean="0"/>
-              <a:t>- </a:t>
-            </a:r>
-            <a:r>
-              <a:rPr lang="fr-FR" dirty="0" err="1" smtClean="0"/>
-              <a:t>Various</a:t>
+              <a:rPr lang="fr-FR" dirty="0" err="1" smtClean="0"/>
+              <a:t>boundary</a:t>
+            </a:r>
+            <a:r>
+              <a:rPr lang="fr-FR" dirty="0" smtClean="0"/>
+              <a:t> types: </a:t>
+            </a:r>
+            <a:r>
+              <a:rPr lang="fr-FR" dirty="0" err="1" smtClean="0"/>
+              <a:t>solid</a:t>
             </a:r>
             <a:r>
               <a:rPr lang="fr-FR" dirty="0" smtClean="0"/>
@@ -5195,47 +5281,27 @@
             </a:r>
             <a:r>
               <a:rPr lang="fr-FR" dirty="0" err="1" smtClean="0"/>
-              <a:t>boundary</a:t>
-            </a:r>
-            <a:r>
-              <a:rPr lang="fr-FR" dirty="0" smtClean="0"/>
-              <a:t> </a:t>
-            </a:r>
-            <a:r>
-              <a:rPr lang="fr-FR" dirty="0" smtClean="0"/>
-              <a:t>types: </a:t>
-            </a:r>
-            <a:r>
-              <a:rPr lang="fr-FR" dirty="0" err="1" smtClean="0"/>
-              <a:t>solid</a:t>
-            </a:r>
-            <a:r>
-              <a:rPr lang="fr-FR" dirty="0" smtClean="0"/>
-              <a:t> </a:t>
-            </a:r>
-            <a:r>
-              <a:rPr lang="fr-FR" dirty="0" err="1" smtClean="0"/>
               <a:t>wall</a:t>
             </a:r>
             <a:r>
-              <a:rPr lang="fr-FR" dirty="0" err="1" smtClean="0"/>
-              <a:t>,inflow</a:t>
-            </a:r>
-            <a:r>
               <a:rPr lang="fr-FR" dirty="0" smtClean="0"/>
               <a:t>, </a:t>
             </a:r>
             <a:r>
               <a:rPr lang="fr-FR" dirty="0" err="1" smtClean="0"/>
+              <a:t>inflow</a:t>
+            </a:r>
+            <a:r>
+              <a:rPr lang="fr-FR" dirty="0" smtClean="0"/>
+              <a:t>, </a:t>
+            </a:r>
+            <a:r>
+              <a:rPr lang="fr-FR" dirty="0" err="1" smtClean="0"/>
               <a:t>outflow</a:t>
             </a:r>
             <a:r>
               <a:rPr lang="fr-FR" dirty="0" smtClean="0"/>
-              <a:t> </a:t>
-            </a:r>
-            <a:r>
-              <a:rPr lang="fr-FR" dirty="0" smtClean="0"/>
-              <a:t>or </a:t>
+              <a:t> or </a:t>
             </a:r>
             <a:r>
               <a:rPr lang="fr-FR" dirty="0" err="1" smtClean="0"/>
@@ -5307,11 +5373,7 @@
           <a:p>
             <a:r>
               <a:rPr lang="fr-FR" dirty="0" smtClean="0"/>
-              <a:t>-   </a:t>
-            </a:r>
-            <a:r>
-              <a:rPr lang="fr-FR" dirty="0" smtClean="0"/>
-              <a:t>Input of </a:t>
+              <a:t>-   Input of </a:t>
             </a:r>
             <a:r>
               <a:rPr lang="fr-FR" dirty="0" err="1" smtClean="0"/>
@@ -5337,7 +5399,6 @@
               <a:rPr lang="fr-FR" dirty="0" smtClean="0"/>
               <a:t> data. </a:t>
             </a:r>
-            <a:endParaRPr lang="fr-FR" dirty="0" smtClean="0"/>
           </a:p>
           <a:p>
             <a:endParaRPr lang="fr-FR" dirty="0" smtClean="0"/>
@@ -5521,150 +5582,97 @@
             </a:r>
           </a:p>
           <a:p>
+            <a:endParaRPr lang="fr-FR" dirty="0" smtClean="0"/>
+          </a:p>
+          <a:p>
+            <a:r>
+              <a:rPr lang="fr-FR" dirty="0" smtClean="0"/>
+              <a:t>- </a:t>
+            </a:r>
+            <a:r>
+              <a:rPr lang="fr-FR" dirty="0" err="1" smtClean="0"/>
+              <a:t>Choice</a:t>
+            </a:r>
+            <a:r>
+              <a:rPr lang="fr-FR" dirty="0" smtClean="0"/>
+              <a:t> made to </a:t>
+            </a:r>
+            <a:r>
+              <a:rPr lang="fr-FR" dirty="0" err="1" smtClean="0"/>
+              <a:t>keep</a:t>
+            </a:r>
+            <a:r>
+              <a:rPr lang="fr-FR" dirty="0" smtClean="0"/>
+              <a:t> the </a:t>
+            </a:r>
+            <a:r>
+              <a:rPr lang="fr-FR" dirty="0" err="1" smtClean="0"/>
+              <a:t>number</a:t>
+            </a:r>
+            <a:r>
+              <a:rPr lang="fr-FR" dirty="0" smtClean="0"/>
+              <a:t> of files </a:t>
+            </a:r>
+            <a:r>
+              <a:rPr lang="fr-FR" dirty="0" err="1" smtClean="0"/>
+              <a:t>relatively</a:t>
+            </a:r>
+            <a:r>
+              <a:rPr lang="fr-FR" dirty="0" smtClean="0"/>
+              <a:t> </a:t>
+            </a:r>
+            <a:r>
+              <a:rPr lang="fr-FR" dirty="0" err="1" smtClean="0"/>
+              <a:t>low</a:t>
+            </a:r>
+            <a:r>
+              <a:rPr lang="fr-FR" dirty="0" smtClean="0"/>
+              <a:t>: 8 files, 10 k </a:t>
+            </a:r>
+            <a:r>
+              <a:rPr lang="fr-FR" dirty="0" err="1" smtClean="0"/>
+              <a:t>lines</a:t>
+            </a:r>
+            <a:r>
+              <a:rPr lang="fr-FR" dirty="0" smtClean="0"/>
+              <a:t> </a:t>
+            </a:r>
+            <a:r>
+              <a:rPr lang="fr-FR" dirty="0" err="1" smtClean="0"/>
+              <a:t>so</a:t>
+            </a:r>
+            <a:r>
+              <a:rPr lang="fr-FR" dirty="0" smtClean="0"/>
+              <a:t> far. </a:t>
+            </a:r>
+          </a:p>
+          <a:p>
             <a:endParaRPr lang="fr-FR" dirty="0"/>
           </a:p>
           <a:p>
             <a:r>
               <a:rPr lang="fr-FR" dirty="0" smtClean="0"/>
-              <a:t>- All of FTC3D2011 (base version </a:t>
-            </a:r>
-            <a:r>
-              <a:rPr lang="fr-FR" dirty="0" err="1" smtClean="0"/>
-              <a:t>without</a:t>
-            </a:r>
-            <a:r>
-              <a:rPr lang="fr-FR" dirty="0" smtClean="0"/>
-              <a:t> front </a:t>
-            </a:r>
-            <a:r>
-              <a:rPr lang="fr-FR" dirty="0" err="1" smtClean="0"/>
-              <a:t>tracking</a:t>
-            </a:r>
-            <a:r>
-              <a:rPr lang="fr-FR" dirty="0" smtClean="0"/>
-              <a:t>) </a:t>
-            </a:r>
-            <a:r>
-              <a:rPr lang="fr-FR" dirty="0" err="1" smtClean="0"/>
-              <a:t>is</a:t>
-            </a:r>
-            <a:r>
-              <a:rPr lang="fr-FR" dirty="0" smtClean="0"/>
-              <a:t> </a:t>
-            </a:r>
-            <a:r>
-              <a:rPr lang="fr-FR" dirty="0" err="1" smtClean="0"/>
-              <a:t>contained</a:t>
-            </a:r>
-            <a:r>
-              <a:rPr lang="fr-FR" dirty="0" smtClean="0"/>
-              <a:t> in </a:t>
-            </a:r>
-            <a:r>
-              <a:rPr lang="fr-FR" dirty="0" err="1" smtClean="0"/>
-              <a:t>two</a:t>
-            </a:r>
-            <a:r>
-              <a:rPr lang="fr-FR" dirty="0" smtClean="0"/>
-              <a:t> f90 files ! </a:t>
-            </a:r>
-            <a:r>
-              <a:rPr lang="fr-FR" dirty="0" err="1" smtClean="0"/>
-              <a:t>Choice</a:t>
-            </a:r>
-            <a:r>
-              <a:rPr lang="fr-FR" dirty="0" smtClean="0"/>
-              <a:t> made to </a:t>
-            </a:r>
-            <a:r>
-              <a:rPr lang="fr-FR" dirty="0" err="1" smtClean="0"/>
-              <a:t>keep</a:t>
-            </a:r>
-            <a:r>
-              <a:rPr lang="fr-FR" dirty="0" smtClean="0"/>
-              <a:t> the </a:t>
-            </a:r>
-            <a:r>
-              <a:rPr lang="fr-FR" dirty="0" err="1" smtClean="0"/>
-              <a:t>number</a:t>
-            </a:r>
-            <a:r>
-              <a:rPr lang="fr-FR" dirty="0" smtClean="0"/>
-              <a:t> of files </a:t>
-            </a:r>
-            <a:r>
-              <a:rPr lang="fr-FR" dirty="0" err="1" smtClean="0"/>
-              <a:t>low</a:t>
-            </a:r>
-            <a:r>
-              <a:rPr lang="fr-FR" dirty="0" smtClean="0"/>
-              <a:t>. </a:t>
-            </a:r>
+              <a:t>- no configure, </a:t>
+            </a:r>
+            <a:r>
+              <a:rPr lang="fr-FR" dirty="0" err="1" smtClean="0"/>
+              <a:t>only</a:t>
+            </a:r>
+            <a:r>
+              <a:rPr lang="fr-FR" dirty="0" smtClean="0"/>
+              <a:t> a short </a:t>
+            </a:r>
+            <a:r>
+              <a:rPr lang="fr-FR" dirty="0" err="1" smtClean="0"/>
+              <a:t>Makefile</a:t>
+            </a:r>
+            <a:endParaRPr lang="fr-FR" dirty="0" smtClean="0"/>
           </a:p>
           <a:p>
             <a:endParaRPr lang="fr-FR" dirty="0"/>
           </a:p>
           <a:p>
-            <a:r>
-              <a:rPr lang="fr-FR" dirty="0" smtClean="0"/>
-              <a:t>- no configure, </a:t>
-            </a:r>
-            <a:r>
-              <a:rPr lang="fr-FR" dirty="0" err="1" smtClean="0"/>
-              <a:t>only</a:t>
-            </a:r>
-            <a:r>
-              <a:rPr lang="fr-FR" dirty="0" smtClean="0"/>
-              <a:t> a short </a:t>
-            </a:r>
-            <a:r>
-              <a:rPr lang="fr-FR" dirty="0" err="1" smtClean="0"/>
-              <a:t>Makefile</a:t>
-            </a:r>
-            <a:r>
-              <a:rPr lang="fr-FR" dirty="0" smtClean="0"/>
-              <a:t>. But C </a:t>
-            </a:r>
-            <a:r>
-              <a:rPr lang="fr-FR" dirty="0" err="1" smtClean="0"/>
-              <a:t>users</a:t>
-            </a:r>
-            <a:r>
-              <a:rPr lang="fr-FR" dirty="0" smtClean="0"/>
-              <a:t> </a:t>
-            </a:r>
-            <a:r>
-              <a:rPr lang="fr-FR" dirty="0" err="1" smtClean="0"/>
-              <a:t>beware</a:t>
-            </a:r>
-            <a:r>
-              <a:rPr lang="fr-FR" dirty="0" smtClean="0"/>
-              <a:t>, f90 compilation </a:t>
-            </a:r>
-            <a:r>
-              <a:rPr lang="fr-FR" dirty="0" err="1" smtClean="0"/>
-              <a:t>involves</a:t>
-            </a:r>
-            <a:r>
-              <a:rPr lang="fr-FR" dirty="0" smtClean="0"/>
-              <a:t> a </a:t>
-            </a:r>
-            <a:r>
-              <a:rPr lang="fr-FR" dirty="0" err="1" smtClean="0"/>
-              <a:t>different</a:t>
-            </a:r>
-            <a:r>
-              <a:rPr lang="fr-FR" dirty="0" smtClean="0"/>
-              <a:t> </a:t>
-            </a:r>
-            <a:r>
-              <a:rPr lang="fr-FR" dirty="0" err="1" smtClean="0"/>
-              <a:t>dependency</a:t>
-            </a:r>
-            <a:r>
-              <a:rPr lang="fr-FR" dirty="0" smtClean="0"/>
-              <a:t> structure.</a:t>
-            </a:r>
+            <a:endParaRPr lang="fr-FR" dirty="0" smtClean="0"/>
           </a:p>
           <a:p>
             <a:endParaRPr lang="fr-FR" dirty="0"/>

</xml_diff>

<commit_message>
Fixes pressure solver issues with inflow/outflow bc and/or solids
I have changed some features related to inflow and  outflow/fixed velocity boundary conditions. 
  
  1) with inflow boundary conditions the velocity at is-1  (that is xh(is-1) )  is not corrected so the two corresponding
  Poisson matrix elements must be changed. Specifically, the 1/rho grad p term at is-1 must be zero. 
  
  2) there was an inconsistency in the pressure correction when 
  
  u = u^* + (1/rho ) grad p
  
  is done together with solid boundaries. 
  
  3) there is a new solver in file newsolver.f90 that is very similar
  to the old one but will evolve to a more efficient solver.
</commit_message>
<xml_diff>
--- a/Documentation/ParisSimulator.pptx
+++ b/Documentation/ParisSimulator.pptx
@@ -19,6 +19,7 @@
     <p:sldId id="268" r:id="rId13"/>
     <p:sldId id="269" r:id="rId14"/>
     <p:sldId id="270" r:id="rId15"/>
+    <p:sldId id="271" r:id="rId16"/>
   </p:sldIdLst>
   <p:sldSz cx="9144000" cy="6858000" type="screen4x3"/>
   <p:notesSz cx="6858000" cy="9144000"/>
@@ -301,7 +302,7 @@
           <a:p>
             <a:fld id="{3E385DA3-9999-6A48-ABB1-3CFD9335C687}" type="datetimeFigureOut">
               <a:rPr lang="fr-FR" smtClean="0"/>
-              <a:t>14/01/2014</a:t>
+              <a:t>21/04/2014</a:t>
             </a:fld>
             <a:endParaRPr lang="fr-FR"/>
           </a:p>
@@ -471,7 +472,7 @@
           <a:p>
             <a:fld id="{3E385DA3-9999-6A48-ABB1-3CFD9335C687}" type="datetimeFigureOut">
               <a:rPr lang="fr-FR" smtClean="0"/>
-              <a:t>14/01/2014</a:t>
+              <a:t>21/04/2014</a:t>
             </a:fld>
             <a:endParaRPr lang="fr-FR"/>
           </a:p>
@@ -651,7 +652,7 @@
           <a:p>
             <a:fld id="{3E385DA3-9999-6A48-ABB1-3CFD9335C687}" type="datetimeFigureOut">
               <a:rPr lang="fr-FR" smtClean="0"/>
-              <a:t>14/01/2014</a:t>
+              <a:t>21/04/2014</a:t>
             </a:fld>
             <a:endParaRPr lang="fr-FR"/>
           </a:p>
@@ -821,7 +822,7 @@
           <a:p>
             <a:fld id="{3E385DA3-9999-6A48-ABB1-3CFD9335C687}" type="datetimeFigureOut">
               <a:rPr lang="fr-FR" smtClean="0"/>
-              <a:t>14/01/2014</a:t>
+              <a:t>21/04/2014</a:t>
             </a:fld>
             <a:endParaRPr lang="fr-FR"/>
           </a:p>
@@ -1067,7 +1068,7 @@
           <a:p>
             <a:fld id="{3E385DA3-9999-6A48-ABB1-3CFD9335C687}" type="datetimeFigureOut">
               <a:rPr lang="fr-FR" smtClean="0"/>
-              <a:t>14/01/2014</a:t>
+              <a:t>21/04/2014</a:t>
             </a:fld>
             <a:endParaRPr lang="fr-FR"/>
           </a:p>
@@ -1355,7 +1356,7 @@
           <a:p>
             <a:fld id="{3E385DA3-9999-6A48-ABB1-3CFD9335C687}" type="datetimeFigureOut">
               <a:rPr lang="fr-FR" smtClean="0"/>
-              <a:t>14/01/2014</a:t>
+              <a:t>21/04/2014</a:t>
             </a:fld>
             <a:endParaRPr lang="fr-FR"/>
           </a:p>
@@ -1777,7 +1778,7 @@
           <a:p>
             <a:fld id="{3E385DA3-9999-6A48-ABB1-3CFD9335C687}" type="datetimeFigureOut">
               <a:rPr lang="fr-FR" smtClean="0"/>
-              <a:t>14/01/2014</a:t>
+              <a:t>21/04/2014</a:t>
             </a:fld>
             <a:endParaRPr lang="fr-FR"/>
           </a:p>
@@ -1895,7 +1896,7 @@
           <a:p>
             <a:fld id="{3E385DA3-9999-6A48-ABB1-3CFD9335C687}" type="datetimeFigureOut">
               <a:rPr lang="fr-FR" smtClean="0"/>
-              <a:t>14/01/2014</a:t>
+              <a:t>21/04/2014</a:t>
             </a:fld>
             <a:endParaRPr lang="fr-FR"/>
           </a:p>
@@ -1990,7 +1991,7 @@
           <a:p>
             <a:fld id="{3E385DA3-9999-6A48-ABB1-3CFD9335C687}" type="datetimeFigureOut">
               <a:rPr lang="fr-FR" smtClean="0"/>
-              <a:t>14/01/2014</a:t>
+              <a:t>21/04/2014</a:t>
             </a:fld>
             <a:endParaRPr lang="fr-FR"/>
           </a:p>
@@ -2267,7 +2268,7 @@
           <a:p>
             <a:fld id="{3E385DA3-9999-6A48-ABB1-3CFD9335C687}" type="datetimeFigureOut">
               <a:rPr lang="fr-FR" smtClean="0"/>
-              <a:t>14/01/2014</a:t>
+              <a:t>21/04/2014</a:t>
             </a:fld>
             <a:endParaRPr lang="fr-FR"/>
           </a:p>
@@ -2520,7 +2521,7 @@
           <a:p>
             <a:fld id="{3E385DA3-9999-6A48-ABB1-3CFD9335C687}" type="datetimeFigureOut">
               <a:rPr lang="fr-FR" smtClean="0"/>
-              <a:t>14/01/2014</a:t>
+              <a:t>21/04/2014</a:t>
             </a:fld>
             <a:endParaRPr lang="fr-FR"/>
           </a:p>
@@ -2733,7 +2734,7 @@
           <a:p>
             <a:fld id="{3E385DA3-9999-6A48-ABB1-3CFD9335C687}" type="datetimeFigureOut">
               <a:rPr lang="fr-FR" smtClean="0"/>
-              <a:t>14/01/2014</a:t>
+              <a:t>21/04/2014</a:t>
             </a:fld>
             <a:endParaRPr lang="fr-FR"/>
           </a:p>
@@ -4001,6 +4002,36 @@
 </p:sld>
 </file>
 
+<file path=ppt/slides/slide15.xml><?xml version="1.0" encoding="utf-8"?>
+<p:sld xmlns:a="http://schemas.openxmlformats.org/drawingml/2006/main" xmlns:r="http://schemas.openxmlformats.org/officeDocument/2006/relationships" xmlns:p="http://schemas.openxmlformats.org/presentationml/2006/main">
+  <p:cSld>
+    <p:spTree>
+      <p:nvGrpSpPr>
+        <p:cNvPr id="1" name=""/>
+        <p:cNvGrpSpPr/>
+        <p:nvPr/>
+      </p:nvGrpSpPr>
+      <p:grpSpPr>
+        <a:xfrm>
+          <a:off x="0" y="0"/>
+          <a:ext cx="0" cy="0"/>
+          <a:chOff x="0" y="0"/>
+          <a:chExt cx="0" cy="0"/>
+        </a:xfrm>
+      </p:grpSpPr>
+    </p:spTree>
+    <p:extLst>
+      <p:ext uri="{BB962C8B-B14F-4D97-AF65-F5344CB8AC3E}">
+        <p14:creationId xmlns:p14="http://schemas.microsoft.com/office/powerpoint/2010/main" val="740352693"/>
+      </p:ext>
+    </p:extLst>
+  </p:cSld>
+  <p:clrMapOvr>
+    <a:masterClrMapping/>
+  </p:clrMapOvr>
+</p:sld>
+</file>
+
 <file path=ppt/slides/slide2.xml><?xml version="1.0" encoding="utf-8"?>
 <p:sld xmlns:a="http://schemas.openxmlformats.org/drawingml/2006/main" xmlns:r="http://schemas.openxmlformats.org/officeDocument/2006/relationships" xmlns:p="http://schemas.openxmlformats.org/presentationml/2006/main">
   <p:cSld>
@@ -4791,7 +4822,7 @@
             </a:r>
             <a:r>
               <a:rPr lang="fr-FR" dirty="0" err="1" smtClean="0"/>
-              <a:t>stagggered</a:t>
+              <a:t>staggered</a:t>
             </a:r>
             <a:r>
               <a:rPr lang="fr-FR" dirty="0" smtClean="0"/>

</xml_diff>